<commit_message>
Präsentation und Kalman-Filter und Clustering Update
</commit_message>
<xml_diff>
--- a/Situation Understanding/Präsentation Kalmanfilter.pptx
+++ b/Situation Understanding/Präsentation Kalmanfilter.pptx
@@ -6,7 +6,7 @@
     <p:sldMasterId id="2147483671" r:id="rId2"/>
   </p:sldMasterIdLst>
   <p:notesMasterIdLst>
-    <p:notesMasterId r:id="rId20"/>
+    <p:notesMasterId r:id="rId21"/>
   </p:notesMasterIdLst>
   <p:sldIdLst>
     <p:sldId id="322" r:id="rId3"/>
@@ -16,16 +16,17 @@
     <p:sldId id="361" r:id="rId7"/>
     <p:sldId id="351" r:id="rId8"/>
     <p:sldId id="360" r:id="rId9"/>
-    <p:sldId id="352" r:id="rId10"/>
-    <p:sldId id="353" r:id="rId11"/>
-    <p:sldId id="358" r:id="rId12"/>
-    <p:sldId id="354" r:id="rId13"/>
-    <p:sldId id="355" r:id="rId14"/>
-    <p:sldId id="362" r:id="rId15"/>
-    <p:sldId id="356" r:id="rId16"/>
-    <p:sldId id="357" r:id="rId17"/>
-    <p:sldId id="359" r:id="rId18"/>
-    <p:sldId id="330" r:id="rId19"/>
+    <p:sldId id="363" r:id="rId10"/>
+    <p:sldId id="352" r:id="rId11"/>
+    <p:sldId id="353" r:id="rId12"/>
+    <p:sldId id="358" r:id="rId13"/>
+    <p:sldId id="354" r:id="rId14"/>
+    <p:sldId id="355" r:id="rId15"/>
+    <p:sldId id="362" r:id="rId16"/>
+    <p:sldId id="356" r:id="rId17"/>
+    <p:sldId id="357" r:id="rId18"/>
+    <p:sldId id="359" r:id="rId19"/>
+    <p:sldId id="330" r:id="rId20"/>
   </p:sldIdLst>
   <p:sldSz cx="12192000" cy="6858000"/>
   <p:notesSz cx="6858000" cy="9144000"/>
@@ -18234,6 +18235,523 @@
           <p:cNvPr id="2" name="Fußzeilenplatzhalter 1">
             <a:extLst>
               <a:ext uri="{FF2B5EF4-FFF2-40B4-BE49-F238E27FC236}">
+                <a16:creationId xmlns:a16="http://schemas.microsoft.com/office/drawing/2014/main" id="{536497C7-719D-99C9-2FE6-E0B804E67B3B}"/>
+              </a:ext>
+            </a:extLst>
+          </p:cNvPr>
+          <p:cNvSpPr>
+            <a:spLocks noGrp="1"/>
+          </p:cNvSpPr>
+          <p:nvPr>
+            <p:ph type="ftr" sz="quarter" idx="11"/>
+          </p:nvPr>
+        </p:nvSpPr>
+        <p:spPr/>
+        <p:txBody>
+          <a:bodyPr/>
+          <a:lstStyle/>
+          <a:p>
+            <a:r>
+              <a:rPr lang="en-US" noProof="0" dirty="0"/>
+              <a:t>Lukas Gerstlauer, Jakob Kurz  |  AS: PSU  |  T1 / Master ASE  |  26.06.2025</a:t>
+            </a:r>
+          </a:p>
+        </p:txBody>
+      </p:sp>
+      <p:sp>
+        <p:nvSpPr>
+          <p:cNvPr id="3" name="Foliennummernplatzhalter 2">
+            <a:extLst>
+              <a:ext uri="{FF2B5EF4-FFF2-40B4-BE49-F238E27FC236}">
+                <a16:creationId xmlns:a16="http://schemas.microsoft.com/office/drawing/2014/main" id="{17937ABD-4C88-8D88-88A9-4232B7CD4E73}"/>
+              </a:ext>
+            </a:extLst>
+          </p:cNvPr>
+          <p:cNvSpPr>
+            <a:spLocks noGrp="1"/>
+          </p:cNvSpPr>
+          <p:nvPr>
+            <p:ph type="sldNum" sz="quarter" idx="12"/>
+          </p:nvPr>
+        </p:nvSpPr>
+        <p:spPr/>
+        <p:txBody>
+          <a:bodyPr/>
+          <a:lstStyle/>
+          <a:p>
+            <a:r>
+              <a:rPr lang="en-US" noProof="0" dirty="0"/>
+              <a:t>|  </a:t>
+            </a:r>
+            <a:fld id="{E6B5151A-17C4-4431-8407-112C0160A8B6}" type="slidenum">
+              <a:rPr lang="en-US" noProof="0" smtClean="0"/>
+              <a:pPr/>
+              <a:t>10</a:t>
+            </a:fld>
+            <a:endParaRPr lang="en-US" noProof="0" dirty="0"/>
+          </a:p>
+        </p:txBody>
+      </p:sp>
+      <p:sp>
+        <p:nvSpPr>
+          <p:cNvPr id="4" name="Titel 3">
+            <a:extLst>
+              <a:ext uri="{FF2B5EF4-FFF2-40B4-BE49-F238E27FC236}">
+                <a16:creationId xmlns:a16="http://schemas.microsoft.com/office/drawing/2014/main" id="{BDB71D6C-F005-47EF-77BA-8DEF89ACA023}"/>
+              </a:ext>
+            </a:extLst>
+          </p:cNvPr>
+          <p:cNvSpPr>
+            <a:spLocks noGrp="1"/>
+          </p:cNvSpPr>
+          <p:nvPr>
+            <p:ph type="title"/>
+          </p:nvPr>
+        </p:nvSpPr>
+        <p:spPr/>
+        <p:txBody>
+          <a:bodyPr/>
+          <a:lstStyle/>
+          <a:p>
+            <a:r>
+              <a:rPr lang="en-US" noProof="0" dirty="0"/>
+              <a:t>Motion / Transition Model</a:t>
+            </a:r>
+          </a:p>
+        </p:txBody>
+      </p:sp>
+      <mc:AlternateContent xmlns:mc="http://schemas.openxmlformats.org/markup-compatibility/2006" xmlns:a14="http://schemas.microsoft.com/office/drawing/2010/main">
+        <mc:Choice Requires="a14">
+          <p:sp>
+            <p:nvSpPr>
+              <p:cNvPr id="5" name="Inhaltsplatzhalter 4">
+                <a:extLst>
+                  <a:ext uri="{FF2B5EF4-FFF2-40B4-BE49-F238E27FC236}">
+                    <a16:creationId xmlns:a16="http://schemas.microsoft.com/office/drawing/2014/main" id="{D14FE133-3F8F-D0B0-9DBC-5157BE1BFA58}"/>
+                  </a:ext>
+                </a:extLst>
+              </p:cNvPr>
+              <p:cNvSpPr>
+                <a:spLocks noGrp="1"/>
+              </p:cNvSpPr>
+              <p:nvPr>
+                <p:ph idx="13"/>
+              </p:nvPr>
+            </p:nvSpPr>
+            <p:spPr/>
+            <p:txBody>
+              <a:bodyPr/>
+              <a:lstStyle/>
+              <a:p>
+                <a:pPr marL="342900" indent="-342900">
+                  <a:buFont typeface="Arial" panose="020B0604020202020204" pitchFamily="34" charset="0"/>
+                  <a:buChar char="•"/>
+                  <a:tabLst>
+                    <a:tab pos="287338" algn="l"/>
+                  </a:tabLst>
+                </a:pPr>
+                <a:r>
+                  <a:rPr lang="en-US" noProof="0" dirty="0"/>
+                  <a:t>System dynamics function</a:t>
+                </a:r>
+                <a14:m>
+                  <m:oMath xmlns:m="http://schemas.openxmlformats.org/officeDocument/2006/math">
+                    <m:r>
+                      <a:rPr lang="en-US" b="0" i="0" noProof="0" smtClean="0">
+                        <a:latin typeface="Cambria Math" panose="02040503050406030204" pitchFamily="18" charset="0"/>
+                      </a:rPr>
+                      <m:t>: </m:t>
+                    </m:r>
+                    <m:r>
+                      <a:rPr lang="en-US" b="0" i="1" noProof="0" smtClean="0">
+                        <a:latin typeface="Cambria Math" panose="02040503050406030204" pitchFamily="18" charset="0"/>
+                      </a:rPr>
+                      <m:t>𝑓</m:t>
+                    </m:r>
+                    <m:d>
+                      <m:dPr>
+                        <m:ctrlPr>
+                          <a:rPr lang="en-US" b="0" i="1" noProof="0" smtClean="0">
+                            <a:latin typeface="Cambria Math" panose="02040503050406030204" pitchFamily="18" charset="0"/>
+                          </a:rPr>
+                        </m:ctrlPr>
+                      </m:dPr>
+                      <m:e>
+                        <m:r>
+                          <a:rPr lang="en-US" b="0" i="1" noProof="0" smtClean="0">
+                            <a:latin typeface="Cambria Math" panose="02040503050406030204" pitchFamily="18" charset="0"/>
+                          </a:rPr>
+                          <m:t>𝑥</m:t>
+                        </m:r>
+                      </m:e>
+                    </m:d>
+                    <m:r>
+                      <a:rPr lang="en-US" b="0" i="1" noProof="0" smtClean="0">
+                        <a:latin typeface="Cambria Math" panose="02040503050406030204" pitchFamily="18" charset="0"/>
+                      </a:rPr>
+                      <m:t>=</m:t>
+                    </m:r>
+                    <m:d>
+                      <m:dPr>
+                        <m:begChr m:val="["/>
+                        <m:endChr m:val="]"/>
+                        <m:ctrlPr>
+                          <a:rPr lang="en-US" b="0" i="1" noProof="0" smtClean="0">
+                            <a:latin typeface="Cambria Math" panose="02040503050406030204" pitchFamily="18" charset="0"/>
+                          </a:rPr>
+                        </m:ctrlPr>
+                      </m:dPr>
+                      <m:e>
+                        <m:m>
+                          <m:mPr>
+                            <m:mcs>
+                              <m:mc>
+                                <m:mcPr>
+                                  <m:count m:val="1"/>
+                                  <m:mcJc m:val="center"/>
+                                </m:mcPr>
+                              </m:mc>
+                            </m:mcs>
+                            <m:ctrlPr>
+                              <a:rPr lang="en-US" b="0" i="1" noProof="0" smtClean="0">
+                                <a:latin typeface="Cambria Math" panose="02040503050406030204" pitchFamily="18" charset="0"/>
+                              </a:rPr>
+                            </m:ctrlPr>
+                          </m:mPr>
+                          <m:mr>
+                            <m:e>
+                              <m:r>
+                                <a:rPr lang="en-US" b="0" i="1" noProof="0" smtClean="0">
+                                  <a:latin typeface="Cambria Math" panose="02040503050406030204" pitchFamily="18" charset="0"/>
+                                </a:rPr>
+                                <m:t>𝑥</m:t>
+                              </m:r>
+                              <m:r>
+                                <a:rPr lang="en-US" i="1" noProof="0">
+                                  <a:latin typeface="Cambria Math" panose="02040503050406030204" pitchFamily="18" charset="0"/>
+                                </a:rPr>
+                                <m:t>+</m:t>
+                              </m:r>
+                              <m:r>
+                                <a:rPr lang="en-US" b="0" i="1" noProof="0" smtClean="0">
+                                  <a:latin typeface="Cambria Math" panose="02040503050406030204" pitchFamily="18" charset="0"/>
+                                </a:rPr>
+                                <m:t>𝑣</m:t>
+                              </m:r>
+                              <m:r>
+                                <a:rPr lang="en-US" i="1" noProof="0">
+                                  <a:latin typeface="Cambria Math" panose="02040503050406030204" pitchFamily="18" charset="0"/>
+                                </a:rPr>
+                                <m:t>⋅</m:t>
+                              </m:r>
+                              <m:func>
+                                <m:funcPr>
+                                  <m:ctrlPr>
+                                    <a:rPr lang="en-US" i="1" noProof="0">
+                                      <a:latin typeface="Cambria Math" panose="02040503050406030204" pitchFamily="18" charset="0"/>
+                                    </a:rPr>
+                                  </m:ctrlPr>
+                                </m:funcPr>
+                                <m:fName>
+                                  <m:r>
+                                    <m:rPr>
+                                      <m:sty m:val="p"/>
+                                    </m:rPr>
+                                    <a:rPr lang="en-US" noProof="0">
+                                      <a:latin typeface="Cambria Math" panose="02040503050406030204" pitchFamily="18" charset="0"/>
+                                    </a:rPr>
+                                    <m:t>cos</m:t>
+                                  </m:r>
+                                </m:fName>
+                                <m:e>
+                                  <m:d>
+                                    <m:dPr>
+                                      <m:ctrlPr>
+                                        <a:rPr lang="en-US" i="1" noProof="0">
+                                          <a:latin typeface="Cambria Math" panose="02040503050406030204" pitchFamily="18" charset="0"/>
+                                        </a:rPr>
+                                      </m:ctrlPr>
+                                    </m:dPr>
+                                    <m:e>
+                                      <m:sSub>
+                                        <m:sSubPr>
+                                          <m:ctrlPr>
+                                            <a:rPr lang="en-US" i="1" noProof="0">
+                                              <a:latin typeface="Cambria Math" panose="02040503050406030204" pitchFamily="18" charset="0"/>
+                                            </a:rPr>
+                                          </m:ctrlPr>
+                                        </m:sSubPr>
+                                        <m:e>
+                                          <m:r>
+                                            <a:rPr lang="en-US" i="1" noProof="0">
+                                              <a:latin typeface="Cambria Math" panose="02040503050406030204" pitchFamily="18" charset="0"/>
+                                            </a:rPr>
+                                            <m:t>𝜃</m:t>
+                                          </m:r>
+                                        </m:e>
+                                        <m:sub>
+                                          <m:r>
+                                            <a:rPr lang="en-US" i="1" noProof="0">
+                                              <a:latin typeface="Cambria Math" panose="02040503050406030204" pitchFamily="18" charset="0"/>
+                                            </a:rPr>
+                                            <m:t>𝑘</m:t>
+                                          </m:r>
+                                        </m:sub>
+                                      </m:sSub>
+                                    </m:e>
+                                  </m:d>
+                                </m:e>
+                              </m:func>
+                              <m:r>
+                                <a:rPr lang="en-US" i="1" noProof="0">
+                                  <a:latin typeface="Cambria Math" panose="02040503050406030204" pitchFamily="18" charset="0"/>
+                                </a:rPr>
+                                <m:t>⋅</m:t>
+                              </m:r>
+                              <m:r>
+                                <a:rPr lang="en-US" i="1" noProof="0">
+                                  <a:latin typeface="Cambria Math" panose="02040503050406030204" pitchFamily="18" charset="0"/>
+                                </a:rPr>
+                                <m:t>𝑑𝑡</m:t>
+                              </m:r>
+                            </m:e>
+                          </m:mr>
+                          <m:mr>
+                            <m:e>
+                              <m:r>
+                                <a:rPr lang="en-US" b="0" i="1" noProof="0" smtClean="0">
+                                  <a:latin typeface="Cambria Math" panose="02040503050406030204" pitchFamily="18" charset="0"/>
+                                </a:rPr>
+                                <m:t>𝑦</m:t>
+                              </m:r>
+                              <m:r>
+                                <a:rPr lang="en-US" i="1" noProof="0">
+                                  <a:latin typeface="Cambria Math" panose="02040503050406030204" pitchFamily="18" charset="0"/>
+                                </a:rPr>
+                                <m:t>+</m:t>
+                              </m:r>
+                              <m:r>
+                                <a:rPr lang="en-US" b="0" i="1" noProof="0" smtClean="0">
+                                  <a:latin typeface="Cambria Math" panose="02040503050406030204" pitchFamily="18" charset="0"/>
+                                </a:rPr>
+                                <m:t>𝑣</m:t>
+                              </m:r>
+                              <m:r>
+                                <a:rPr lang="en-US" i="1" noProof="0">
+                                  <a:latin typeface="Cambria Math" panose="02040503050406030204" pitchFamily="18" charset="0"/>
+                                </a:rPr>
+                                <m:t>⋅</m:t>
+                              </m:r>
+                              <m:func>
+                                <m:funcPr>
+                                  <m:ctrlPr>
+                                    <a:rPr lang="en-US" i="1" noProof="0">
+                                      <a:latin typeface="Cambria Math" panose="02040503050406030204" pitchFamily="18" charset="0"/>
+                                    </a:rPr>
+                                  </m:ctrlPr>
+                                </m:funcPr>
+                                <m:fName>
+                                  <m:r>
+                                    <a:rPr lang="en-US" i="1" noProof="0">
+                                      <a:latin typeface="Cambria Math" panose="02040503050406030204" pitchFamily="18" charset="0"/>
+                                    </a:rPr>
+                                    <m:t>𝑠𝑖𝑛</m:t>
+                                  </m:r>
+                                </m:fName>
+                                <m:e>
+                                  <m:d>
+                                    <m:dPr>
+                                      <m:ctrlPr>
+                                        <a:rPr lang="en-US" i="1" noProof="0">
+                                          <a:latin typeface="Cambria Math" panose="02040503050406030204" pitchFamily="18" charset="0"/>
+                                        </a:rPr>
+                                      </m:ctrlPr>
+                                    </m:dPr>
+                                    <m:e>
+                                      <m:sSub>
+                                        <m:sSubPr>
+                                          <m:ctrlPr>
+                                            <a:rPr lang="en-US" i="1" noProof="0">
+                                              <a:latin typeface="Cambria Math" panose="02040503050406030204" pitchFamily="18" charset="0"/>
+                                            </a:rPr>
+                                          </m:ctrlPr>
+                                        </m:sSubPr>
+                                        <m:e>
+                                          <m:r>
+                                            <a:rPr lang="en-US" i="1" noProof="0">
+                                              <a:latin typeface="Cambria Math" panose="02040503050406030204" pitchFamily="18" charset="0"/>
+                                            </a:rPr>
+                                            <m:t>𝜃</m:t>
+                                          </m:r>
+                                        </m:e>
+                                        <m:sub>
+                                          <m:r>
+                                            <a:rPr lang="en-US" i="1" noProof="0">
+                                              <a:latin typeface="Cambria Math" panose="02040503050406030204" pitchFamily="18" charset="0"/>
+                                            </a:rPr>
+                                            <m:t>𝑘</m:t>
+                                          </m:r>
+                                        </m:sub>
+                                      </m:sSub>
+                                    </m:e>
+                                  </m:d>
+                                </m:e>
+                              </m:func>
+                              <m:r>
+                                <a:rPr lang="en-US" i="1" noProof="0">
+                                  <a:latin typeface="Cambria Math" panose="02040503050406030204" pitchFamily="18" charset="0"/>
+                                </a:rPr>
+                                <m:t>⋅</m:t>
+                              </m:r>
+                              <m:r>
+                                <a:rPr lang="en-US" i="1" noProof="0">
+                                  <a:latin typeface="Cambria Math" panose="02040503050406030204" pitchFamily="18" charset="0"/>
+                                </a:rPr>
+                                <m:t>𝑑𝑡</m:t>
+                              </m:r>
+                            </m:e>
+                          </m:mr>
+                          <m:mr>
+                            <m:e>
+                              <m:r>
+                                <a:rPr lang="en-US" b="0" i="1" noProof="0" smtClean="0">
+                                  <a:latin typeface="Cambria Math" panose="02040503050406030204" pitchFamily="18" charset="0"/>
+                                </a:rPr>
+                                <m:t>𝜃</m:t>
+                              </m:r>
+                              <m:r>
+                                <a:rPr lang="en-US" i="1" noProof="0">
+                                  <a:latin typeface="Cambria Math" panose="02040503050406030204" pitchFamily="18" charset="0"/>
+                                </a:rPr>
+                                <m:t>+</m:t>
+                              </m:r>
+                              <m:r>
+                                <a:rPr lang="en-US" b="0" i="1" noProof="0" smtClean="0">
+                                  <a:latin typeface="Cambria Math" panose="02040503050406030204" pitchFamily="18" charset="0"/>
+                                </a:rPr>
+                                <m:t>𝜔</m:t>
+                              </m:r>
+                              <m:r>
+                                <a:rPr lang="en-US" i="1" noProof="0">
+                                  <a:latin typeface="Cambria Math" panose="02040503050406030204" pitchFamily="18" charset="0"/>
+                                </a:rPr>
+                                <m:t>⋅</m:t>
+                              </m:r>
+                              <m:r>
+                                <a:rPr lang="en-US" i="1" noProof="0">
+                                  <a:latin typeface="Cambria Math" panose="02040503050406030204" pitchFamily="18" charset="0"/>
+                                </a:rPr>
+                                <m:t>𝑑𝑡</m:t>
+                              </m:r>
+                            </m:e>
+                          </m:mr>
+                          <m:mr>
+                            <m:e>
+                              <m:r>
+                                <a:rPr lang="en-US" b="0" i="1" noProof="0" smtClean="0">
+                                  <a:latin typeface="Cambria Math" panose="02040503050406030204" pitchFamily="18" charset="0"/>
+                                </a:rPr>
+                                <m:t>𝑣</m:t>
+                              </m:r>
+                            </m:e>
+                          </m:mr>
+                          <m:mr>
+                            <m:e>
+                              <m:r>
+                                <a:rPr lang="en-US" b="0" i="1" noProof="0" smtClean="0">
+                                  <a:latin typeface="Cambria Math" panose="02040503050406030204" pitchFamily="18" charset="0"/>
+                                </a:rPr>
+                                <m:t>𝜔</m:t>
+                              </m:r>
+                            </m:e>
+                          </m:mr>
+                        </m:m>
+                      </m:e>
+                    </m:d>
+                  </m:oMath>
+                </a14:m>
+                <a:endParaRPr lang="en-US" b="0" i="1" noProof="0" dirty="0">
+                  <a:latin typeface="Cambria Math" panose="02040503050406030204" pitchFamily="18" charset="0"/>
+                </a:endParaRPr>
+              </a:p>
+            </p:txBody>
+          </p:sp>
+        </mc:Choice>
+        <mc:Fallback xmlns="">
+          <p:sp>
+            <p:nvSpPr>
+              <p:cNvPr id="5" name="Inhaltsplatzhalter 4">
+                <a:extLst>
+                  <a:ext uri="{FF2B5EF4-FFF2-40B4-BE49-F238E27FC236}">
+                    <a16:creationId xmlns:a16="http://schemas.microsoft.com/office/drawing/2014/main" id="{D14FE133-3F8F-D0B0-9DBC-5157BE1BFA58}"/>
+                  </a:ext>
+                </a:extLst>
+              </p:cNvPr>
+              <p:cNvSpPr>
+                <a:spLocks noGrp="1" noRot="1" noChangeAspect="1" noMove="1" noResize="1" noEditPoints="1" noAdjustHandles="1" noChangeArrowheads="1" noChangeShapeType="1" noTextEdit="1"/>
+              </p:cNvSpPr>
+              <p:nvPr>
+                <p:ph idx="13"/>
+              </p:nvPr>
+            </p:nvSpPr>
+            <p:spPr>
+              <a:blipFill>
+                <a:blip r:embed="rId2"/>
+                <a:stretch>
+                  <a:fillRect l="-1447"/>
+                </a:stretch>
+              </a:blipFill>
+            </p:spPr>
+            <p:txBody>
+              <a:bodyPr/>
+              <a:lstStyle/>
+              <a:p>
+                <a:r>
+                  <a:rPr lang="de-DE">
+                    <a:noFill/>
+                  </a:rPr>
+                  <a:t> </a:t>
+                </a:r>
+              </a:p>
+            </p:txBody>
+          </p:sp>
+        </mc:Fallback>
+      </mc:AlternateContent>
+    </p:spTree>
+    <p:extLst>
+      <p:ext uri="{BB962C8B-B14F-4D97-AF65-F5344CB8AC3E}">
+        <p14:creationId xmlns:p14="http://schemas.microsoft.com/office/powerpoint/2010/main" val="3097636369"/>
+      </p:ext>
+    </p:extLst>
+  </p:cSld>
+  <p:clrMapOvr>
+    <a:masterClrMapping/>
+  </p:clrMapOvr>
+</p:sld>
+</file>
+
+<file path=ppt/slides/slide11.xml><?xml version="1.0" encoding="utf-8"?>
+<p:sld xmlns:a="http://schemas.openxmlformats.org/drawingml/2006/main" xmlns:r="http://schemas.openxmlformats.org/officeDocument/2006/relationships" xmlns:p="http://schemas.openxmlformats.org/presentationml/2006/main">
+  <p:cSld>
+    <p:spTree>
+      <p:nvGrpSpPr>
+        <p:cNvPr id="1" name=""/>
+        <p:cNvGrpSpPr/>
+        <p:nvPr/>
+      </p:nvGrpSpPr>
+      <p:grpSpPr>
+        <a:xfrm>
+          <a:off x="0" y="0"/>
+          <a:ext cx="0" cy="0"/>
+          <a:chOff x="0" y="0"/>
+          <a:chExt cx="0" cy="0"/>
+        </a:xfrm>
+      </p:grpSpPr>
+      <p:sp>
+        <p:nvSpPr>
+          <p:cNvPr id="2" name="Fußzeilenplatzhalter 1">
+            <a:extLst>
+              <a:ext uri="{FF2B5EF4-FFF2-40B4-BE49-F238E27FC236}">
                 <a16:creationId xmlns:a16="http://schemas.microsoft.com/office/drawing/2014/main" id="{079282B2-7DD0-5FE0-D5E3-808E39A4B502}"/>
               </a:ext>
             </a:extLst>
@@ -18285,7 +18803,7 @@
             <a:fld id="{E6B5151A-17C4-4431-8407-112C0160A8B6}" type="slidenum">
               <a:rPr lang="en-US" noProof="0" smtClean="0"/>
               <a:pPr/>
-              <a:t>10</a:t>
+              <a:t>11</a:t>
             </a:fld>
             <a:endParaRPr lang="en-US" noProof="0" dirty="0"/>
           </a:p>
@@ -18669,7 +19187,7 @@
 </p:sld>
 </file>
 
-<file path=ppt/slides/slide11.xml><?xml version="1.0" encoding="utf-8"?>
+<file path=ppt/slides/slide12.xml><?xml version="1.0" encoding="utf-8"?>
 <p:sld xmlns:a="http://schemas.openxmlformats.org/drawingml/2006/main" xmlns:r="http://schemas.openxmlformats.org/officeDocument/2006/relationships" xmlns:p="http://schemas.openxmlformats.org/presentationml/2006/main">
   <p:cSld>
     <p:spTree>
@@ -18748,7 +19266,7 @@
             <a:fld id="{E6B5151A-17C4-4431-8407-112C0160A8B6}" type="slidenum">
               <a:rPr lang="en-US" noProof="0" smtClean="0"/>
               <a:pPr/>
-              <a:t>11</a:t>
+              <a:t>12</a:t>
             </a:fld>
             <a:endParaRPr lang="en-US" noProof="0" dirty="0"/>
           </a:p>
@@ -19939,7 +20457,7 @@
 </p:sld>
 </file>
 
-<file path=ppt/slides/slide12.xml><?xml version="1.0" encoding="utf-8"?>
+<file path=ppt/slides/slide13.xml><?xml version="1.0" encoding="utf-8"?>
 <p:sld xmlns:a="http://schemas.openxmlformats.org/drawingml/2006/main" xmlns:r="http://schemas.openxmlformats.org/officeDocument/2006/relationships" xmlns:p="http://schemas.openxmlformats.org/presentationml/2006/main">
   <p:cSld>
     <p:spTree>
@@ -20018,7 +20536,7 @@
             <a:fld id="{E6B5151A-17C4-4431-8407-112C0160A8B6}" type="slidenum">
               <a:rPr lang="en-US" noProof="0" smtClean="0"/>
               <a:pPr/>
-              <a:t>12</a:t>
+              <a:t>13</a:t>
             </a:fld>
             <a:endParaRPr lang="en-US" noProof="0" dirty="0"/>
           </a:p>
@@ -20057,8 +20575,8 @@
           </a:p>
         </p:txBody>
       </p:sp>
-      <mc:AlternateContent xmlns:mc="http://schemas.openxmlformats.org/markup-compatibility/2006">
-        <mc:Choice xmlns:a14="http://schemas.microsoft.com/office/drawing/2010/main" Requires="a14">
+      <mc:AlternateContent xmlns:mc="http://schemas.openxmlformats.org/markup-compatibility/2006" xmlns:a14="http://schemas.microsoft.com/office/drawing/2010/main">
+        <mc:Choice Requires="a14">
           <p:sp>
             <p:nvSpPr>
               <p:cNvPr id="6" name="Inhaltsplatzhalter 5">
@@ -21151,7 +21669,7 @@
             </p:txBody>
           </p:sp>
         </mc:Choice>
-        <mc:Fallback>
+        <mc:Fallback xmlns="">
           <p:sp>
             <p:nvSpPr>
               <p:cNvPr id="6" name="Inhaltsplatzhalter 5">
@@ -21204,7 +21722,7 @@
 </p:sld>
 </file>
 
-<file path=ppt/slides/slide13.xml><?xml version="1.0" encoding="utf-8"?>
+<file path=ppt/slides/slide14.xml><?xml version="1.0" encoding="utf-8"?>
 <p:sld xmlns:a="http://schemas.openxmlformats.org/drawingml/2006/main" xmlns:r="http://schemas.openxmlformats.org/officeDocument/2006/relationships" xmlns:p="http://schemas.openxmlformats.org/presentationml/2006/main">
   <p:cSld>
     <p:spTree>
@@ -21277,7 +21795,7 @@
             <a:fld id="{E6B5151A-17C4-4431-8407-112C0160A8B6}" type="slidenum">
               <a:rPr lang="en-US" noProof="0" smtClean="0"/>
               <a:pPr/>
-              <a:t>13</a:t>
+              <a:t>14</a:t>
             </a:fld>
             <a:endParaRPr lang="en-US" noProof="0" dirty="0"/>
           </a:p>
@@ -22443,7 +22961,7 @@
 </p:sld>
 </file>
 
-<file path=ppt/slides/slide14.xml><?xml version="1.0" encoding="utf-8"?>
+<file path=ppt/slides/slide15.xml><?xml version="1.0" encoding="utf-8"?>
 <p:sld xmlns:a="http://schemas.openxmlformats.org/drawingml/2006/main" xmlns:r="http://schemas.openxmlformats.org/officeDocument/2006/relationships" xmlns:p="http://schemas.openxmlformats.org/presentationml/2006/main">
   <p:cSld>
     <p:spTree>
@@ -22522,7 +23040,7 @@
             <a:fld id="{E6B5151A-17C4-4431-8407-112C0160A8B6}" type="slidenum">
               <a:rPr lang="en-US" noProof="0" smtClean="0"/>
               <a:pPr/>
-              <a:t>14</a:t>
+              <a:t>15</a:t>
             </a:fld>
             <a:endParaRPr lang="en-US" noProof="0" dirty="0"/>
           </a:p>
@@ -22799,7 +23317,7 @@
 </p:sld>
 </file>
 
-<file path=ppt/slides/slide15.xml><?xml version="1.0" encoding="utf-8"?>
+<file path=ppt/slides/slide16.xml><?xml version="1.0" encoding="utf-8"?>
 <p:sld xmlns:a="http://schemas.openxmlformats.org/drawingml/2006/main" xmlns:r="http://schemas.openxmlformats.org/officeDocument/2006/relationships" xmlns:p="http://schemas.openxmlformats.org/presentationml/2006/main">
   <p:cSld>
     <p:spTree>
@@ -22878,7 +23396,7 @@
             <a:fld id="{E6B5151A-17C4-4431-8407-112C0160A8B6}" type="slidenum">
               <a:rPr lang="en-US" noProof="0" smtClean="0"/>
               <a:pPr/>
-              <a:t>15</a:t>
+              <a:t>16</a:t>
             </a:fld>
             <a:endParaRPr lang="en-US" noProof="0" dirty="0"/>
           </a:p>
@@ -22970,7 +23488,7 @@
 </p:sld>
 </file>
 
-<file path=ppt/slides/slide16.xml><?xml version="1.0" encoding="utf-8"?>
+<file path=ppt/slides/slide17.xml><?xml version="1.0" encoding="utf-8"?>
 <p:sld xmlns:a="http://schemas.openxmlformats.org/drawingml/2006/main" xmlns:r="http://schemas.openxmlformats.org/officeDocument/2006/relationships" xmlns:p="http://schemas.openxmlformats.org/presentationml/2006/main">
   <p:cSld>
     <p:spTree>
@@ -23043,7 +23561,7 @@
             <a:fld id="{E6B5151A-17C4-4431-8407-112C0160A8B6}" type="slidenum">
               <a:rPr lang="en-US" noProof="0" smtClean="0"/>
               <a:pPr/>
-              <a:t>16</a:t>
+              <a:t>17</a:t>
             </a:fld>
             <a:endParaRPr lang="en-US" noProof="0" dirty="0"/>
           </a:p>
@@ -23115,7 +23633,7 @@
 </p:sld>
 </file>
 
-<file path=ppt/slides/slide17.xml><?xml version="1.0" encoding="utf-8"?>
+<file path=ppt/slides/slide18.xml><?xml version="1.0" encoding="utf-8"?>
 <p:sld xmlns:a="http://schemas.openxmlformats.org/drawingml/2006/main" xmlns:r="http://schemas.openxmlformats.org/officeDocument/2006/relationships" xmlns:p="http://schemas.openxmlformats.org/presentationml/2006/main">
   <p:cSld>
     <p:spTree>
@@ -23188,7 +23706,7 @@
             <a:fld id="{E6B5151A-17C4-4431-8407-112C0160A8B6}" type="slidenum">
               <a:rPr lang="en-US" noProof="0" smtClean="0"/>
               <a:pPr/>
-              <a:t>17</a:t>
+              <a:t>18</a:t>
             </a:fld>
             <a:endParaRPr lang="en-US" noProof="0" dirty="0"/>
           </a:p>
@@ -24725,63 +25243,491 @@
             <p:ph type="title"/>
           </p:nvPr>
         </p:nvSpPr>
-        <p:spPr/>
+        <p:spPr>
+          <a:xfrm>
+            <a:off x="405315" y="311353"/>
+            <a:ext cx="10520351" cy="339096"/>
+          </a:xfrm>
+        </p:spPr>
         <p:txBody>
           <a:bodyPr/>
           <a:lstStyle/>
           <a:p>
             <a:r>
-              <a:rPr lang="en-US" noProof="0" dirty="0" err="1"/>
-              <a:t>Mulit</a:t>
-            </a:r>
-            <a:r>
-              <a:rPr lang="en-US" noProof="0" dirty="0"/>
-              <a:t> Target Tracking</a:t>
-            </a:r>
-          </a:p>
-        </p:txBody>
-      </p:sp>
-      <p:sp>
-        <p:nvSpPr>
-          <p:cNvPr id="5" name="Inhaltsplatzhalter 4">
-            <a:extLst>
-              <a:ext uri="{FF2B5EF4-FFF2-40B4-BE49-F238E27FC236}">
-                <a16:creationId xmlns:a16="http://schemas.microsoft.com/office/drawing/2014/main" id="{0A3AC5CE-8CFA-0DF3-3BFD-7F28E1BE1A25}"/>
-              </a:ext>
-            </a:extLst>
-          </p:cNvPr>
-          <p:cNvSpPr>
-            <a:spLocks noGrp="1"/>
-          </p:cNvSpPr>
-          <p:nvPr>
-            <p:ph idx="13"/>
-          </p:nvPr>
-        </p:nvSpPr>
-        <p:spPr/>
-        <p:txBody>
-          <a:bodyPr/>
-          <a:lstStyle/>
-          <a:p>
-            <a:pPr marL="342900" indent="-342900">
-              <a:buFont typeface="Arial" panose="020B0604020202020204" pitchFamily="34" charset="0"/>
-              <a:buChar char="•"/>
-            </a:pPr>
-            <a:r>
-              <a:rPr lang="en-US" noProof="0" dirty="0" err="1">
-                <a:sym typeface="Wingdings" panose="05000000000000000000" pitchFamily="2" charset="2"/>
-              </a:rPr>
-              <a:t>Mahalanobis</a:t>
-            </a:r>
-            <a:r>
-              <a:rPr lang="en-US" noProof="0" dirty="0">
-                <a:sym typeface="Wingdings" panose="05000000000000000000" pitchFamily="2" charset="2"/>
-              </a:rPr>
-              <a:t> distance</a:t>
+              <a:rPr lang="en-US" dirty="0"/>
+              <a:t>Sensor Clustering with DBSCAN – Mathematical Context &amp; Implementation</a:t>
             </a:r>
             <a:endParaRPr lang="en-US" noProof="0" dirty="0"/>
           </a:p>
         </p:txBody>
       </p:sp>
+      <mc:AlternateContent xmlns:mc="http://schemas.openxmlformats.org/markup-compatibility/2006">
+        <mc:Choice xmlns:a14="http://schemas.microsoft.com/office/drawing/2010/main" Requires="a14">
+          <p:sp>
+            <p:nvSpPr>
+              <p:cNvPr id="5" name="Inhaltsplatzhalter 4">
+                <a:extLst>
+                  <a:ext uri="{FF2B5EF4-FFF2-40B4-BE49-F238E27FC236}">
+                    <a16:creationId xmlns:a16="http://schemas.microsoft.com/office/drawing/2014/main" id="{0A3AC5CE-8CFA-0DF3-3BFD-7F28E1BE1A25}"/>
+                  </a:ext>
+                </a:extLst>
+              </p:cNvPr>
+              <p:cNvSpPr>
+                <a:spLocks noGrp="1"/>
+              </p:cNvSpPr>
+              <p:nvPr>
+                <p:ph idx="13"/>
+              </p:nvPr>
+            </p:nvSpPr>
+            <p:spPr/>
+            <p:txBody>
+              <a:bodyPr/>
+              <a:lstStyle/>
+              <a:p>
+                <a:pPr marL="342900" indent="-342900">
+                  <a:lnSpc>
+                    <a:spcPct val="90000"/>
+                  </a:lnSpc>
+                  <a:buFont typeface="Arial" panose="020B0604020202020204" pitchFamily="34" charset="0"/>
+                  <a:buChar char="•"/>
+                </a:pPr>
+                <a:r>
+                  <a:rPr lang="en-US" b="1" dirty="0"/>
+                  <a:t>Purpose:</a:t>
+                </a:r>
+                <a:r>
+                  <a:rPr lang="en-US" dirty="0"/>
+                  <a:t> Reduce noisy detections by clustering nearby sensor data (camera &amp; LiDAR).</a:t>
+                </a:r>
+              </a:p>
+              <a:p>
+                <a:pPr marL="342900" indent="-342900">
+                  <a:lnSpc>
+                    <a:spcPct val="90000"/>
+                  </a:lnSpc>
+                  <a:buFont typeface="Arial" panose="020B0604020202020204" pitchFamily="34" charset="0"/>
+                  <a:buChar char="•"/>
+                </a:pPr>
+                <a:r>
+                  <a:rPr lang="en-US" b="1" dirty="0"/>
+                  <a:t>Algorithm:</a:t>
+                </a:r>
+                <a:r>
+                  <a:rPr lang="en-US" dirty="0"/>
+                  <a:t> DBSCAN groups detections based on ε-radius proximity and point density.</a:t>
+                </a:r>
+              </a:p>
+              <a:p>
+                <a:pPr marL="342900" indent="-342900">
+                  <a:lnSpc>
+                    <a:spcPct val="90000"/>
+                  </a:lnSpc>
+                  <a:buFont typeface="Arial" panose="020B0604020202020204" pitchFamily="34" charset="0"/>
+                  <a:buChar char="•"/>
+                </a:pPr>
+                <a:r>
+                  <a:rPr lang="en-US" b="1" dirty="0"/>
+                  <a:t>Mathematical basis:</a:t>
+                </a:r>
+                <a:r>
+                  <a:rPr lang="en-US" dirty="0"/>
+                  <a:t> Points </a:t>
+                </a:r>
+                <a14:m>
+                  <m:oMath xmlns:m="http://schemas.openxmlformats.org/officeDocument/2006/math">
+                    <m:sSub>
+                      <m:sSubPr>
+                        <m:ctrlPr>
+                          <a:rPr lang="en-US" i="1" dirty="0" smtClean="0">
+                            <a:latin typeface="Cambria Math" panose="02040503050406030204" pitchFamily="18" charset="0"/>
+                          </a:rPr>
+                        </m:ctrlPr>
+                      </m:sSubPr>
+                      <m:e>
+                        <m:r>
+                          <a:rPr lang="de-DE" b="0" i="1" dirty="0" smtClean="0">
+                            <a:latin typeface="Cambria Math" panose="02040503050406030204" pitchFamily="18" charset="0"/>
+                          </a:rPr>
+                          <m:t>𝑥</m:t>
+                        </m:r>
+                      </m:e>
+                      <m:sub>
+                        <m:r>
+                          <a:rPr lang="de-DE" b="0" i="1" dirty="0" smtClean="0">
+                            <a:latin typeface="Cambria Math" panose="02040503050406030204" pitchFamily="18" charset="0"/>
+                          </a:rPr>
+                          <m:t>𝑖</m:t>
+                        </m:r>
+                      </m:sub>
+                    </m:sSub>
+                    <m:r>
+                      <a:rPr lang="de-DE" b="0" i="1" dirty="0" smtClean="0">
+                        <a:latin typeface="Cambria Math" panose="02040503050406030204" pitchFamily="18" charset="0"/>
+                      </a:rPr>
+                      <m:t> </m:t>
+                    </m:r>
+                    <m:r>
+                      <a:rPr lang="de-DE" b="0" i="1" dirty="0" smtClean="0">
+                        <a:latin typeface="Cambria Math" panose="02040503050406030204" pitchFamily="18" charset="0"/>
+                        <a:ea typeface="Cambria Math" panose="02040503050406030204" pitchFamily="18" charset="0"/>
+                      </a:rPr>
+                      <m:t>∈ </m:t>
+                    </m:r>
+                    <m:sSup>
+                      <m:sSupPr>
+                        <m:ctrlPr>
+                          <a:rPr lang="de-DE" b="0" i="1" dirty="0" smtClean="0">
+                            <a:latin typeface="Cambria Math" panose="02040503050406030204" pitchFamily="18" charset="0"/>
+                            <a:ea typeface="Cambria Math" panose="02040503050406030204" pitchFamily="18" charset="0"/>
+                          </a:rPr>
+                        </m:ctrlPr>
+                      </m:sSupPr>
+                      <m:e>
+                        <m:r>
+                          <a:rPr lang="de-DE" b="0" i="1" dirty="0" smtClean="0">
+                            <a:latin typeface="Cambria Math" panose="02040503050406030204" pitchFamily="18" charset="0"/>
+                            <a:ea typeface="Cambria Math" panose="02040503050406030204" pitchFamily="18" charset="0"/>
+                          </a:rPr>
+                          <m:t>𝑅</m:t>
+                        </m:r>
+                      </m:e>
+                      <m:sup>
+                        <m:r>
+                          <a:rPr lang="de-DE" b="0" i="1" dirty="0" smtClean="0">
+                            <a:latin typeface="Cambria Math" panose="02040503050406030204" pitchFamily="18" charset="0"/>
+                            <a:ea typeface="Cambria Math" panose="02040503050406030204" pitchFamily="18" charset="0"/>
+                          </a:rPr>
+                          <m:t>2</m:t>
+                        </m:r>
+                      </m:sup>
+                    </m:sSup>
+                  </m:oMath>
+                </a14:m>
+                <a:r>
+                  <a:rPr lang="en-US" dirty="0"/>
+                  <a:t> form clusters if within ε-distance and satisfy </a:t>
+                </a:r>
+                <a:r>
+                  <a:rPr lang="en-US" dirty="0" err="1"/>
+                  <a:t>minPts</a:t>
+                </a:r>
+                <a:r>
+                  <a:rPr lang="en-US" dirty="0"/>
+                  <a:t>.</a:t>
+                </a:r>
+              </a:p>
+              <a:p>
+                <a:pPr marL="342900" indent="-342900">
+                  <a:lnSpc>
+                    <a:spcPct val="90000"/>
+                  </a:lnSpc>
+                  <a:buFont typeface="Arial" panose="020B0604020202020204" pitchFamily="34" charset="0"/>
+                  <a:buChar char="•"/>
+                </a:pPr>
+                <a:r>
+                  <a:rPr lang="de-DE" b="1" dirty="0" err="1"/>
+                  <a:t>Centroid</a:t>
+                </a:r>
+                <a:r>
+                  <a:rPr lang="de-DE" b="1" dirty="0"/>
+                  <a:t> </a:t>
+                </a:r>
+                <a:r>
+                  <a:rPr lang="de-DE" b="1" dirty="0" err="1"/>
+                  <a:t>computation</a:t>
+                </a:r>
+                <a:r>
+                  <a:rPr lang="de-DE" b="1" dirty="0"/>
+                  <a:t>:</a:t>
+                </a:r>
+                <a:r>
+                  <a:rPr lang="de-DE" dirty="0"/>
+                  <a:t> </a:t>
+                </a:r>
+                <a:r>
+                  <a:rPr lang="de-DE" dirty="0" err="1"/>
+                  <a:t>For</a:t>
+                </a:r>
+                <a:r>
+                  <a:rPr lang="de-DE" dirty="0"/>
+                  <a:t> </a:t>
+                </a:r>
+                <a:r>
+                  <a:rPr lang="de-DE" dirty="0" err="1"/>
+                  <a:t>each</a:t>
+                </a:r>
+                <a:r>
+                  <a:rPr lang="de-DE" dirty="0"/>
+                  <a:t> </a:t>
+                </a:r>
+                <a:r>
+                  <a:rPr lang="de-DE" dirty="0" err="1"/>
+                  <a:t>cluster</a:t>
+                </a:r>
+                <a:r>
+                  <a:rPr lang="de-DE" dirty="0"/>
+                  <a:t> </a:t>
+                </a:r>
+                <a14:m>
+                  <m:oMath xmlns:m="http://schemas.openxmlformats.org/officeDocument/2006/math">
+                    <m:r>
+                      <a:rPr lang="de-DE" i="1" dirty="0" smtClean="0">
+                        <a:latin typeface="Cambria Math" panose="02040503050406030204" pitchFamily="18" charset="0"/>
+                      </a:rPr>
+                      <m:t>𝐶</m:t>
+                    </m:r>
+                  </m:oMath>
+                </a14:m>
+                <a:r>
+                  <a:rPr lang="de-DE" dirty="0"/>
+                  <a:t>, </a:t>
+                </a:r>
+                <a:r>
+                  <a:rPr lang="de-DE" dirty="0" err="1"/>
+                  <a:t>the</a:t>
+                </a:r>
+                <a:r>
+                  <a:rPr lang="de-DE" dirty="0"/>
+                  <a:t> </a:t>
+                </a:r>
+                <a:r>
+                  <a:rPr lang="de-DE" dirty="0" err="1"/>
+                  <a:t>centroid</a:t>
+                </a:r>
+                <a:r>
+                  <a:rPr lang="de-DE" dirty="0"/>
+                  <a:t> </a:t>
+                </a:r>
+                <a14:m>
+                  <m:oMath xmlns:m="http://schemas.openxmlformats.org/officeDocument/2006/math">
+                    <m:r>
+                      <a:rPr lang="el-GR" i="1" dirty="0" smtClean="0">
+                        <a:latin typeface="Cambria Math" panose="02040503050406030204" pitchFamily="18" charset="0"/>
+                      </a:rPr>
+                      <m:t>𝜇</m:t>
+                    </m:r>
+                    <m:r>
+                      <a:rPr lang="el-GR" i="1" dirty="0" smtClean="0">
+                        <a:latin typeface="Cambria Math" panose="02040503050406030204" pitchFamily="18" charset="0"/>
+                      </a:rPr>
+                      <m:t>= </m:t>
+                    </m:r>
+                    <m:f>
+                      <m:fPr>
+                        <m:ctrlPr>
+                          <a:rPr lang="de-DE" b="0" i="1" dirty="0" smtClean="0">
+                            <a:latin typeface="Cambria Math" panose="02040503050406030204" pitchFamily="18" charset="0"/>
+                          </a:rPr>
+                        </m:ctrlPr>
+                      </m:fPr>
+                      <m:num>
+                        <m:r>
+                          <a:rPr lang="de-DE" b="0" i="1" dirty="0" smtClean="0">
+                            <a:latin typeface="Cambria Math" panose="02040503050406030204" pitchFamily="18" charset="0"/>
+                          </a:rPr>
+                          <m:t>1</m:t>
+                        </m:r>
+                      </m:num>
+                      <m:den>
+                        <m:d>
+                          <m:dPr>
+                            <m:begChr m:val="|"/>
+                            <m:endChr m:val="|"/>
+                            <m:ctrlPr>
+                              <a:rPr lang="de-DE" b="0" i="1" dirty="0" smtClean="0">
+                                <a:latin typeface="Cambria Math" panose="02040503050406030204" pitchFamily="18" charset="0"/>
+                              </a:rPr>
+                            </m:ctrlPr>
+                          </m:dPr>
+                          <m:e>
+                            <m:r>
+                              <a:rPr lang="de-DE" b="0" i="1" dirty="0" smtClean="0">
+                                <a:latin typeface="Cambria Math" panose="02040503050406030204" pitchFamily="18" charset="0"/>
+                              </a:rPr>
+                              <m:t>𝐶</m:t>
+                            </m:r>
+                          </m:e>
+                        </m:d>
+                      </m:den>
+                    </m:f>
+                    <m:nary>
+                      <m:naryPr>
+                        <m:chr m:val="∑"/>
+                        <m:subHide m:val="on"/>
+                        <m:supHide m:val="on"/>
+                        <m:ctrlPr>
+                          <a:rPr lang="de-DE" b="0" i="1" dirty="0" smtClean="0">
+                            <a:latin typeface="Cambria Math" panose="02040503050406030204" pitchFamily="18" charset="0"/>
+                          </a:rPr>
+                        </m:ctrlPr>
+                      </m:naryPr>
+                      <m:sub/>
+                      <m:sup/>
+                      <m:e>
+                        <m:sSub>
+                          <m:sSubPr>
+                            <m:ctrlPr>
+                              <a:rPr lang="de-DE" b="0" i="1" dirty="0" smtClean="0">
+                                <a:latin typeface="Cambria Math" panose="02040503050406030204" pitchFamily="18" charset="0"/>
+                              </a:rPr>
+                            </m:ctrlPr>
+                          </m:sSubPr>
+                          <m:e>
+                            <m:r>
+                              <a:rPr lang="de-DE" b="0" i="1" dirty="0" smtClean="0">
+                                <a:latin typeface="Cambria Math" panose="02040503050406030204" pitchFamily="18" charset="0"/>
+                              </a:rPr>
+                              <m:t>𝑥</m:t>
+                            </m:r>
+                          </m:e>
+                          <m:sub>
+                            <m:r>
+                              <a:rPr lang="de-DE" b="0" i="1" dirty="0" smtClean="0">
+                                <a:latin typeface="Cambria Math" panose="02040503050406030204" pitchFamily="18" charset="0"/>
+                              </a:rPr>
+                              <m:t>𝑖</m:t>
+                            </m:r>
+                          </m:sub>
+                        </m:sSub>
+                      </m:e>
+                    </m:nary>
+                  </m:oMath>
+                </a14:m>
+                <a:r>
+                  <a:rPr lang="de-DE" dirty="0"/>
+                  <a:t>​ </a:t>
+                </a:r>
+                <a:r>
+                  <a:rPr lang="de-DE" dirty="0" err="1"/>
+                  <a:t>is</a:t>
+                </a:r>
+                <a:r>
+                  <a:rPr lang="de-DE" dirty="0"/>
+                  <a:t> </a:t>
+                </a:r>
+                <a:r>
+                  <a:rPr lang="de-DE" dirty="0" err="1"/>
+                  <a:t>used</a:t>
+                </a:r>
+                <a:r>
+                  <a:rPr lang="de-DE" dirty="0"/>
+                  <a:t> </a:t>
+                </a:r>
+                <a:r>
+                  <a:rPr lang="de-DE" dirty="0" err="1"/>
+                  <a:t>as</a:t>
+                </a:r>
+                <a:r>
+                  <a:rPr lang="de-DE" dirty="0"/>
+                  <a:t> a </a:t>
+                </a:r>
+                <a:r>
+                  <a:rPr lang="de-DE" dirty="0" err="1"/>
+                  <a:t>proxy</a:t>
+                </a:r>
+                <a:r>
+                  <a:rPr lang="de-DE" dirty="0"/>
+                  <a:t> </a:t>
+                </a:r>
+                <a:r>
+                  <a:rPr lang="de-DE" dirty="0" err="1"/>
+                  <a:t>measurement</a:t>
+                </a:r>
+                <a:r>
+                  <a:rPr lang="de-DE" dirty="0"/>
+                  <a:t>.</a:t>
+                </a:r>
+              </a:p>
+              <a:p>
+                <a:pPr marL="342900" indent="-342900">
+                  <a:lnSpc>
+                    <a:spcPct val="90000"/>
+                  </a:lnSpc>
+                  <a:buFont typeface="Arial" panose="020B0604020202020204" pitchFamily="34" charset="0"/>
+                  <a:buChar char="•"/>
+                </a:pPr>
+                <a:r>
+                  <a:rPr lang="en-US" b="1" noProof="0" dirty="0"/>
+                  <a:t>Implementation:</a:t>
+                </a:r>
+                <a:r>
+                  <a:rPr lang="en-US" noProof="0" dirty="0"/>
+                  <a:t> </a:t>
+                </a:r>
+                <a:r>
+                  <a:rPr lang="en-US" i="1" noProof="0" dirty="0" err="1"/>
+                  <a:t>cluster_measurements</a:t>
+                </a:r>
+                <a:r>
+                  <a:rPr lang="en-US" i="1" noProof="0" dirty="0"/>
+                  <a:t>()</a:t>
+                </a:r>
+                <a:r>
+                  <a:rPr lang="en-US" noProof="0" dirty="0"/>
+                  <a:t> filters outliers (label = -1), returns only valid cluster centers.</a:t>
+                </a:r>
+              </a:p>
+              <a:p>
+                <a:pPr marL="342900" indent="-342900">
+                  <a:lnSpc>
+                    <a:spcPct val="90000"/>
+                  </a:lnSpc>
+                  <a:buFont typeface="Arial" panose="020B0604020202020204" pitchFamily="34" charset="0"/>
+                  <a:buChar char="•"/>
+                </a:pPr>
+                <a:r>
+                  <a:rPr lang="en-US" b="1" dirty="0"/>
+                  <a:t>Impact:</a:t>
+                </a:r>
+                <a:r>
+                  <a:rPr lang="en-US" dirty="0"/>
+                  <a:t> Significantly reduces input dimensionality and improves assignment stability.</a:t>
+                </a:r>
+                <a:endParaRPr lang="en-US" noProof="0" dirty="0"/>
+              </a:p>
+            </p:txBody>
+          </p:sp>
+        </mc:Choice>
+        <mc:Fallback>
+          <p:sp>
+            <p:nvSpPr>
+              <p:cNvPr id="5" name="Inhaltsplatzhalter 4">
+                <a:extLst>
+                  <a:ext uri="{FF2B5EF4-FFF2-40B4-BE49-F238E27FC236}">
+                    <a16:creationId xmlns:a16="http://schemas.microsoft.com/office/drawing/2014/main" id="{0A3AC5CE-8CFA-0DF3-3BFD-7F28E1BE1A25}"/>
+                  </a:ext>
+                </a:extLst>
+              </p:cNvPr>
+              <p:cNvSpPr>
+                <a:spLocks noGrp="1" noRot="1" noChangeAspect="1" noMove="1" noResize="1" noEditPoints="1" noAdjustHandles="1" noChangeArrowheads="1" noChangeShapeType="1" noTextEdit="1"/>
+              </p:cNvSpPr>
+              <p:nvPr>
+                <p:ph idx="13"/>
+              </p:nvPr>
+            </p:nvSpPr>
+            <p:spPr>
+              <a:blipFill>
+                <a:blip r:embed="rId2"/>
+                <a:stretch>
+                  <a:fillRect l="-1447" t="-2363" r="-214"/>
+                </a:stretch>
+              </a:blipFill>
+            </p:spPr>
+            <p:txBody>
+              <a:bodyPr/>
+              <a:lstStyle/>
+              <a:p>
+                <a:r>
+                  <a:rPr lang="de-DE">
+                    <a:noFill/>
+                  </a:rPr>
+                  <a:t> </a:t>
+                </a:r>
+              </a:p>
+            </p:txBody>
+          </p:sp>
+        </mc:Fallback>
+      </mc:AlternateContent>
     </p:spTree>
     <p:extLst>
       <p:ext uri="{BB962C8B-B14F-4D97-AF65-F5344CB8AC3E}">
@@ -24796,6 +25742,530 @@
 </file>
 
 <file path=ppt/slides/slide8.xml><?xml version="1.0" encoding="utf-8"?>
+<p:sld xmlns:a="http://schemas.openxmlformats.org/drawingml/2006/main" xmlns:r="http://schemas.openxmlformats.org/officeDocument/2006/relationships" xmlns:p="http://schemas.openxmlformats.org/presentationml/2006/main">
+  <p:cSld>
+    <p:spTree>
+      <p:nvGrpSpPr>
+        <p:cNvPr id="1" name=""/>
+        <p:cNvGrpSpPr/>
+        <p:nvPr/>
+      </p:nvGrpSpPr>
+      <p:grpSpPr>
+        <a:xfrm>
+          <a:off x="0" y="0"/>
+          <a:ext cx="0" cy="0"/>
+          <a:chOff x="0" y="0"/>
+          <a:chExt cx="0" cy="0"/>
+        </a:xfrm>
+      </p:grpSpPr>
+      <p:sp>
+        <p:nvSpPr>
+          <p:cNvPr id="2" name="Fußzeilenplatzhalter 1">
+            <a:extLst>
+              <a:ext uri="{FF2B5EF4-FFF2-40B4-BE49-F238E27FC236}">
+                <a16:creationId xmlns:a16="http://schemas.microsoft.com/office/drawing/2014/main" id="{4AEAAFE8-AE3A-93AC-3742-F323105C2DAC}"/>
+              </a:ext>
+            </a:extLst>
+          </p:cNvPr>
+          <p:cNvSpPr>
+            <a:spLocks noGrp="1"/>
+          </p:cNvSpPr>
+          <p:nvPr>
+            <p:ph type="ftr" sz="quarter" idx="11"/>
+          </p:nvPr>
+        </p:nvSpPr>
+        <p:spPr/>
+        <p:txBody>
+          <a:bodyPr/>
+          <a:lstStyle/>
+          <a:p>
+            <a:r>
+              <a:rPr lang="de-DE"/>
+              <a:t>Lukas Gerstlauer, Jakob Kurz  |  AS: PSU  |  T1 / Master ASE  |  26.06.2025</a:t>
+            </a:r>
+            <a:endParaRPr lang="de-DE" dirty="0"/>
+          </a:p>
+        </p:txBody>
+      </p:sp>
+      <p:sp>
+        <p:nvSpPr>
+          <p:cNvPr id="3" name="Foliennummernplatzhalter 2">
+            <a:extLst>
+              <a:ext uri="{FF2B5EF4-FFF2-40B4-BE49-F238E27FC236}">
+                <a16:creationId xmlns:a16="http://schemas.microsoft.com/office/drawing/2014/main" id="{F14AF11C-3191-B5E9-EA34-4CC123C3C1A9}"/>
+              </a:ext>
+            </a:extLst>
+          </p:cNvPr>
+          <p:cNvSpPr>
+            <a:spLocks noGrp="1"/>
+          </p:cNvSpPr>
+          <p:nvPr>
+            <p:ph type="sldNum" sz="quarter" idx="12"/>
+          </p:nvPr>
+        </p:nvSpPr>
+        <p:spPr/>
+        <p:txBody>
+          <a:bodyPr/>
+          <a:lstStyle/>
+          <a:p>
+            <a:r>
+              <a:rPr lang="de-DE"/>
+              <a:t>|  </a:t>
+            </a:r>
+            <a:fld id="{E6B5151A-17C4-4431-8407-112C0160A8B6}" type="slidenum">
+              <a:rPr lang="de-DE" smtClean="0"/>
+              <a:pPr/>
+              <a:t>8</a:t>
+            </a:fld>
+            <a:endParaRPr lang="de-DE" dirty="0"/>
+          </a:p>
+        </p:txBody>
+      </p:sp>
+      <p:sp>
+        <p:nvSpPr>
+          <p:cNvPr id="4" name="Titel 3">
+            <a:extLst>
+              <a:ext uri="{FF2B5EF4-FFF2-40B4-BE49-F238E27FC236}">
+                <a16:creationId xmlns:a16="http://schemas.microsoft.com/office/drawing/2014/main" id="{D1D063A3-A70B-70C8-DDF5-D64BA21BF4CA}"/>
+              </a:ext>
+            </a:extLst>
+          </p:cNvPr>
+          <p:cNvSpPr>
+            <a:spLocks noGrp="1"/>
+          </p:cNvSpPr>
+          <p:nvPr>
+            <p:ph type="title"/>
+          </p:nvPr>
+        </p:nvSpPr>
+        <p:spPr/>
+        <p:txBody>
+          <a:bodyPr/>
+          <a:lstStyle/>
+          <a:p>
+            <a:r>
+              <a:rPr lang="de-DE" dirty="0" err="1"/>
+              <a:t>Mahalanobis</a:t>
+            </a:r>
+            <a:r>
+              <a:rPr lang="de-DE" dirty="0"/>
+              <a:t> </a:t>
+            </a:r>
+            <a:r>
+              <a:rPr lang="de-DE" dirty="0" err="1"/>
+              <a:t>Distance</a:t>
+            </a:r>
+            <a:r>
+              <a:rPr lang="de-DE" dirty="0"/>
+              <a:t> &amp; Multi-Target Data </a:t>
+            </a:r>
+            <a:r>
+              <a:rPr lang="de-DE" dirty="0" err="1"/>
+              <a:t>Association</a:t>
+            </a:r>
+            <a:endParaRPr lang="de-DE" dirty="0"/>
+          </a:p>
+        </p:txBody>
+      </p:sp>
+      <mc:AlternateContent xmlns:mc="http://schemas.openxmlformats.org/markup-compatibility/2006">
+        <mc:Choice xmlns:a14="http://schemas.microsoft.com/office/drawing/2010/main" Requires="a14">
+          <p:sp>
+            <p:nvSpPr>
+              <p:cNvPr id="5" name="Inhaltsplatzhalter 4">
+                <a:extLst>
+                  <a:ext uri="{FF2B5EF4-FFF2-40B4-BE49-F238E27FC236}">
+                    <a16:creationId xmlns:a16="http://schemas.microsoft.com/office/drawing/2014/main" id="{898CFFA5-C45A-B585-CC3C-8D9FEB6D10B6}"/>
+                  </a:ext>
+                </a:extLst>
+              </p:cNvPr>
+              <p:cNvSpPr>
+                <a:spLocks noGrp="1"/>
+              </p:cNvSpPr>
+              <p:nvPr>
+                <p:ph idx="13"/>
+              </p:nvPr>
+            </p:nvSpPr>
+            <p:spPr/>
+            <p:txBody>
+              <a:bodyPr/>
+              <a:lstStyle/>
+              <a:p>
+                <a:pPr marL="342900" indent="-342900">
+                  <a:buFont typeface="Arial" panose="020B0604020202020204" pitchFamily="34" charset="0"/>
+                  <a:buChar char="•"/>
+                </a:pPr>
+                <a:r>
+                  <a:rPr lang="en-US" b="1" dirty="0"/>
+                  <a:t>Goal:</a:t>
+                </a:r>
+                <a:r>
+                  <a:rPr lang="en-US" dirty="0"/>
+                  <a:t> Assign clustered measurements to EKF tracks based on statistical compatibility.</a:t>
+                </a:r>
+              </a:p>
+              <a:p>
+                <a:pPr marL="342900" indent="-342900">
+                  <a:buFont typeface="Arial" panose="020B0604020202020204" pitchFamily="34" charset="0"/>
+                  <a:buChar char="•"/>
+                </a:pPr>
+                <a:r>
+                  <a:rPr lang="de-DE" b="1" dirty="0" err="1"/>
+                  <a:t>Mahalanobis</a:t>
+                </a:r>
+                <a:r>
+                  <a:rPr lang="de-DE" b="1" dirty="0"/>
+                  <a:t> </a:t>
+                </a:r>
+                <a:r>
+                  <a:rPr lang="de-DE" b="1" dirty="0" err="1"/>
+                  <a:t>distance</a:t>
+                </a:r>
+                <a:r>
+                  <a:rPr lang="de-DE" b="1" dirty="0"/>
+                  <a:t>: </a:t>
+                </a:r>
+                <a14:m>
+                  <m:oMath xmlns:m="http://schemas.openxmlformats.org/officeDocument/2006/math">
+                    <m:sSup>
+                      <m:sSupPr>
+                        <m:ctrlPr>
+                          <a:rPr lang="de-DE" i="1" smtClean="0">
+                            <a:latin typeface="Cambria Math" panose="02040503050406030204" pitchFamily="18" charset="0"/>
+                          </a:rPr>
+                        </m:ctrlPr>
+                      </m:sSupPr>
+                      <m:e>
+                        <m:r>
+                          <a:rPr lang="de-DE" b="0" i="1" smtClean="0">
+                            <a:latin typeface="Cambria Math" panose="02040503050406030204" pitchFamily="18" charset="0"/>
+                          </a:rPr>
+                          <m:t>𝑑</m:t>
+                        </m:r>
+                      </m:e>
+                      <m:sup>
+                        <m:r>
+                          <a:rPr lang="de-DE" b="0" i="1" smtClean="0">
+                            <a:latin typeface="Cambria Math" panose="02040503050406030204" pitchFamily="18" charset="0"/>
+                          </a:rPr>
+                          <m:t>2</m:t>
+                        </m:r>
+                      </m:sup>
+                    </m:sSup>
+                    <m:r>
+                      <a:rPr lang="de-DE" b="0" i="1" smtClean="0">
+                        <a:latin typeface="Cambria Math" panose="02040503050406030204" pitchFamily="18" charset="0"/>
+                      </a:rPr>
+                      <m:t>=</m:t>
+                    </m:r>
+                    <m:sSup>
+                      <m:sSupPr>
+                        <m:ctrlPr>
+                          <a:rPr lang="de-DE" i="1" smtClean="0">
+                            <a:latin typeface="Cambria Math" panose="02040503050406030204" pitchFamily="18" charset="0"/>
+                          </a:rPr>
+                        </m:ctrlPr>
+                      </m:sSupPr>
+                      <m:e>
+                        <m:r>
+                          <a:rPr lang="de-DE" b="0" i="1">
+                            <a:latin typeface="Cambria Math" panose="02040503050406030204" pitchFamily="18" charset="0"/>
+                          </a:rPr>
+                          <m:t>(</m:t>
+                        </m:r>
+                        <m:r>
+                          <a:rPr lang="de-DE" b="0" i="1">
+                            <a:latin typeface="Cambria Math" panose="02040503050406030204" pitchFamily="18" charset="0"/>
+                          </a:rPr>
+                          <m:t>𝑧</m:t>
+                        </m:r>
+                        <m:r>
+                          <a:rPr lang="de-DE" b="0" i="1">
+                            <a:latin typeface="Cambria Math" panose="02040503050406030204" pitchFamily="18" charset="0"/>
+                          </a:rPr>
+                          <m:t>−</m:t>
+                        </m:r>
+                        <m:r>
+                          <a:rPr lang="de-DE" b="0" i="1">
+                            <a:latin typeface="Cambria Math" panose="02040503050406030204" pitchFamily="18" charset="0"/>
+                          </a:rPr>
+                          <m:t>h</m:t>
+                        </m:r>
+                        <m:r>
+                          <a:rPr lang="de-DE" b="0" i="1">
+                            <a:latin typeface="Cambria Math" panose="02040503050406030204" pitchFamily="18" charset="0"/>
+                          </a:rPr>
+                          <m:t>(</m:t>
+                        </m:r>
+                        <m:r>
+                          <a:rPr lang="de-DE" b="0" i="1">
+                            <a:latin typeface="Cambria Math" panose="02040503050406030204" pitchFamily="18" charset="0"/>
+                          </a:rPr>
+                          <m:t>𝑥</m:t>
+                        </m:r>
+                        <m:r>
+                          <a:rPr lang="de-DE" b="0" i="1">
+                            <a:latin typeface="Cambria Math" panose="02040503050406030204" pitchFamily="18" charset="0"/>
+                          </a:rPr>
+                          <m:t>))</m:t>
+                        </m:r>
+                      </m:e>
+                      <m:sup>
+                        <m:r>
+                          <a:rPr lang="de-DE" b="0" i="1" smtClean="0">
+                            <a:latin typeface="Cambria Math" panose="02040503050406030204" pitchFamily="18" charset="0"/>
+                          </a:rPr>
+                          <m:t>𝑇</m:t>
+                        </m:r>
+                      </m:sup>
+                    </m:sSup>
+                    <m:sSup>
+                      <m:sSupPr>
+                        <m:ctrlPr>
+                          <a:rPr lang="de-DE" i="1" smtClean="0">
+                            <a:latin typeface="Cambria Math" panose="02040503050406030204" pitchFamily="18" charset="0"/>
+                          </a:rPr>
+                        </m:ctrlPr>
+                      </m:sSupPr>
+                      <m:e>
+                        <m:r>
+                          <a:rPr lang="de-DE" b="0" i="1" smtClean="0">
+                            <a:latin typeface="Cambria Math" panose="02040503050406030204" pitchFamily="18" charset="0"/>
+                          </a:rPr>
+                          <m:t>𝑆</m:t>
+                        </m:r>
+                      </m:e>
+                      <m:sup>
+                        <m:r>
+                          <a:rPr lang="de-DE" b="0" i="1" smtClean="0">
+                            <a:latin typeface="Cambria Math" panose="02040503050406030204" pitchFamily="18" charset="0"/>
+                          </a:rPr>
+                          <m:t>−1</m:t>
+                        </m:r>
+                      </m:sup>
+                    </m:sSup>
+                  </m:oMath>
+                </a14:m>
+                <a:r>
+                  <a:rPr lang="de-DE" dirty="0"/>
+                  <a:t> </a:t>
+                </a:r>
+                <a14:m>
+                  <m:oMath xmlns:m="http://schemas.openxmlformats.org/officeDocument/2006/math">
+                    <m:r>
+                      <a:rPr lang="de-DE" b="0" i="1">
+                        <a:latin typeface="Cambria Math" panose="02040503050406030204" pitchFamily="18" charset="0"/>
+                      </a:rPr>
+                      <m:t>(</m:t>
+                    </m:r>
+                    <m:r>
+                      <a:rPr lang="de-DE" b="0" i="1">
+                        <a:latin typeface="Cambria Math" panose="02040503050406030204" pitchFamily="18" charset="0"/>
+                      </a:rPr>
+                      <m:t>𝑧</m:t>
+                    </m:r>
+                    <m:r>
+                      <a:rPr lang="de-DE" b="0" i="1">
+                        <a:latin typeface="Cambria Math" panose="02040503050406030204" pitchFamily="18" charset="0"/>
+                      </a:rPr>
+                      <m:t>−</m:t>
+                    </m:r>
+                    <m:r>
+                      <a:rPr lang="de-DE" b="0" i="1">
+                        <a:latin typeface="Cambria Math" panose="02040503050406030204" pitchFamily="18" charset="0"/>
+                      </a:rPr>
+                      <m:t>h</m:t>
+                    </m:r>
+                    <m:r>
+                      <a:rPr lang="de-DE" b="0" i="1">
+                        <a:latin typeface="Cambria Math" panose="02040503050406030204" pitchFamily="18" charset="0"/>
+                      </a:rPr>
+                      <m:t>(</m:t>
+                    </m:r>
+                    <m:r>
+                      <a:rPr lang="de-DE" b="0" i="1">
+                        <a:latin typeface="Cambria Math" panose="02040503050406030204" pitchFamily="18" charset="0"/>
+                      </a:rPr>
+                      <m:t>𝑥</m:t>
+                    </m:r>
+                    <m:r>
+                      <a:rPr lang="de-DE" b="0" i="1">
+                        <a:latin typeface="Cambria Math" panose="02040503050406030204" pitchFamily="18" charset="0"/>
+                      </a:rPr>
+                      <m:t>))</m:t>
+                    </m:r>
+                  </m:oMath>
+                </a14:m>
+                <a:r>
+                  <a:rPr lang="de-DE" dirty="0"/>
+                  <a:t>, mit  </a:t>
+                </a:r>
+                <a14:m>
+                  <m:oMath xmlns:m="http://schemas.openxmlformats.org/officeDocument/2006/math">
+                    <m:r>
+                      <a:rPr lang="de-DE" b="0" i="1" smtClean="0">
+                        <a:latin typeface="Cambria Math" panose="02040503050406030204" pitchFamily="18" charset="0"/>
+                      </a:rPr>
+                      <m:t>𝑆</m:t>
+                    </m:r>
+                    <m:r>
+                      <a:rPr lang="de-DE" b="0" i="1" smtClean="0">
+                        <a:latin typeface="Cambria Math" panose="02040503050406030204" pitchFamily="18" charset="0"/>
+                      </a:rPr>
+                      <m:t>=</m:t>
+                    </m:r>
+                    <m:r>
+                      <a:rPr lang="de-DE" b="0" i="1" smtClean="0">
+                        <a:latin typeface="Cambria Math" panose="02040503050406030204" pitchFamily="18" charset="0"/>
+                      </a:rPr>
+                      <m:t>𝐻𝑃</m:t>
+                    </m:r>
+                    <m:sSup>
+                      <m:sSupPr>
+                        <m:ctrlPr>
+                          <a:rPr lang="de-DE" i="1" smtClean="0">
+                            <a:latin typeface="Cambria Math" panose="02040503050406030204" pitchFamily="18" charset="0"/>
+                          </a:rPr>
+                        </m:ctrlPr>
+                      </m:sSupPr>
+                      <m:e>
+                        <m:r>
+                          <a:rPr lang="de-DE" b="0" i="1" smtClean="0">
+                            <a:latin typeface="Cambria Math" panose="02040503050406030204" pitchFamily="18" charset="0"/>
+                          </a:rPr>
+                          <m:t>𝐻</m:t>
+                        </m:r>
+                      </m:e>
+                      <m:sup>
+                        <m:r>
+                          <a:rPr lang="de-DE" b="0" i="1" smtClean="0">
+                            <a:latin typeface="Cambria Math" panose="02040503050406030204" pitchFamily="18" charset="0"/>
+                          </a:rPr>
+                          <m:t>𝑇</m:t>
+                        </m:r>
+                      </m:sup>
+                    </m:sSup>
+                    <m:r>
+                      <a:rPr lang="de-DE" b="0" i="1" smtClean="0">
+                        <a:latin typeface="Cambria Math" panose="02040503050406030204" pitchFamily="18" charset="0"/>
+                      </a:rPr>
+                      <m:t>+</m:t>
+                    </m:r>
+                    <m:r>
+                      <a:rPr lang="de-DE" b="0" i="1" smtClean="0">
+                        <a:latin typeface="Cambria Math" panose="02040503050406030204" pitchFamily="18" charset="0"/>
+                      </a:rPr>
+                      <m:t>𝑅</m:t>
+                    </m:r>
+                  </m:oMath>
+                </a14:m>
+                <a:endParaRPr lang="de-DE" dirty="0"/>
+              </a:p>
+              <a:p>
+                <a:pPr marL="342900" indent="-342900">
+                  <a:buFont typeface="Arial" panose="020B0604020202020204" pitchFamily="34" charset="0"/>
+                  <a:buChar char="•"/>
+                </a:pPr>
+                <a:r>
+                  <a:rPr lang="en-US" b="1" dirty="0"/>
+                  <a:t>Assignment logic:</a:t>
+                </a:r>
+                <a:r>
+                  <a:rPr lang="en-US" dirty="0"/>
+                  <a:t> Cost matrix built from all EKF–cluster pairs using </a:t>
+                </a:r>
+                <a:r>
+                  <a:rPr lang="en-US" dirty="0" err="1"/>
+                  <a:t>Mahalanobis</a:t>
+                </a:r>
+                <a:r>
+                  <a:rPr lang="en-US" dirty="0"/>
+                  <a:t> distances.</a:t>
+                </a:r>
+              </a:p>
+              <a:p>
+                <a:pPr marL="342900" indent="-342900">
+                  <a:buFont typeface="Arial" panose="020B0604020202020204" pitchFamily="34" charset="0"/>
+                  <a:buChar char="•"/>
+                </a:pPr>
+                <a:r>
+                  <a:rPr lang="en-US" b="1" dirty="0"/>
+                  <a:t>Optimization:</a:t>
+                </a:r>
+                <a:r>
+                  <a:rPr lang="en-US" dirty="0"/>
+                  <a:t> Hungarian Algorithm solves linear sum assignment for minimal total distance.</a:t>
+                </a:r>
+              </a:p>
+              <a:p>
+                <a:pPr marL="342900" indent="-342900">
+                  <a:buFont typeface="Arial" panose="020B0604020202020204" pitchFamily="34" charset="0"/>
+                  <a:buChar char="•"/>
+                </a:pPr>
+                <a:r>
+                  <a:rPr lang="en-US" b="1" dirty="0"/>
+                  <a:t>Fallbacks:</a:t>
+                </a:r>
+                <a:r>
+                  <a:rPr lang="en-US" dirty="0"/>
+                  <a:t> Unassigned tracks receive nearest valid measurement under relaxed threshold.</a:t>
+                </a:r>
+              </a:p>
+            </p:txBody>
+          </p:sp>
+        </mc:Choice>
+        <mc:Fallback>
+          <p:sp>
+            <p:nvSpPr>
+              <p:cNvPr id="5" name="Inhaltsplatzhalter 4">
+                <a:extLst>
+                  <a:ext uri="{FF2B5EF4-FFF2-40B4-BE49-F238E27FC236}">
+                    <a16:creationId xmlns:a16="http://schemas.microsoft.com/office/drawing/2014/main" id="{898CFFA5-C45A-B585-CC3C-8D9FEB6D10B6}"/>
+                  </a:ext>
+                </a:extLst>
+              </p:cNvPr>
+              <p:cNvSpPr>
+                <a:spLocks noGrp="1" noRot="1" noChangeAspect="1" noMove="1" noResize="1" noEditPoints="1" noAdjustHandles="1" noChangeArrowheads="1" noChangeShapeType="1" noTextEdit="1"/>
+              </p:cNvSpPr>
+              <p:nvPr>
+                <p:ph idx="13"/>
+              </p:nvPr>
+            </p:nvSpPr>
+            <p:spPr>
+              <a:blipFill>
+                <a:blip r:embed="rId2"/>
+                <a:stretch>
+                  <a:fillRect l="-1447" t="-1866"/>
+                </a:stretch>
+              </a:blipFill>
+            </p:spPr>
+            <p:txBody>
+              <a:bodyPr/>
+              <a:lstStyle/>
+              <a:p>
+                <a:r>
+                  <a:rPr lang="de-DE">
+                    <a:noFill/>
+                  </a:rPr>
+                  <a:t> </a:t>
+                </a:r>
+              </a:p>
+            </p:txBody>
+          </p:sp>
+        </mc:Fallback>
+      </mc:AlternateContent>
+    </p:spTree>
+    <p:extLst>
+      <p:ext uri="{BB962C8B-B14F-4D97-AF65-F5344CB8AC3E}">
+        <p14:creationId xmlns:p14="http://schemas.microsoft.com/office/powerpoint/2010/main" val="2073913115"/>
+      </p:ext>
+    </p:extLst>
+  </p:cSld>
+  <p:clrMapOvr>
+    <a:masterClrMapping/>
+  </p:clrMapOvr>
+</p:sld>
+</file>
+
+<file path=ppt/slides/slide9.xml><?xml version="1.0" encoding="utf-8"?>
 <p:sld xmlns:a="http://schemas.openxmlformats.org/drawingml/2006/main" xmlns:r="http://schemas.openxmlformats.org/officeDocument/2006/relationships" xmlns:p="http://schemas.openxmlformats.org/presentationml/2006/main">
   <p:cSld>
     <p:spTree>
@@ -24874,7 +26344,7 @@
             <a:fld id="{E6B5151A-17C4-4431-8407-112C0160A8B6}" type="slidenum">
               <a:rPr lang="en-US" noProof="0" smtClean="0"/>
               <a:pPr/>
-              <a:t>8</a:t>
+              <a:t>9</a:t>
             </a:fld>
             <a:endParaRPr lang="en-US" noProof="0" dirty="0"/>
           </a:p>
@@ -25408,523 +26878,6 @@
       <p188:commentRel xmlns:p188="http://schemas.microsoft.com/office/powerpoint/2018/8/main" r:id="rId2"/>
     </p:ext>
   </p:extLst>
-</p:sld>
-</file>
-
-<file path=ppt/slides/slide9.xml><?xml version="1.0" encoding="utf-8"?>
-<p:sld xmlns:a="http://schemas.openxmlformats.org/drawingml/2006/main" xmlns:r="http://schemas.openxmlformats.org/officeDocument/2006/relationships" xmlns:p="http://schemas.openxmlformats.org/presentationml/2006/main">
-  <p:cSld>
-    <p:spTree>
-      <p:nvGrpSpPr>
-        <p:cNvPr id="1" name=""/>
-        <p:cNvGrpSpPr/>
-        <p:nvPr/>
-      </p:nvGrpSpPr>
-      <p:grpSpPr>
-        <a:xfrm>
-          <a:off x="0" y="0"/>
-          <a:ext cx="0" cy="0"/>
-          <a:chOff x="0" y="0"/>
-          <a:chExt cx="0" cy="0"/>
-        </a:xfrm>
-      </p:grpSpPr>
-      <p:sp>
-        <p:nvSpPr>
-          <p:cNvPr id="2" name="Fußzeilenplatzhalter 1">
-            <a:extLst>
-              <a:ext uri="{FF2B5EF4-FFF2-40B4-BE49-F238E27FC236}">
-                <a16:creationId xmlns:a16="http://schemas.microsoft.com/office/drawing/2014/main" id="{536497C7-719D-99C9-2FE6-E0B804E67B3B}"/>
-              </a:ext>
-            </a:extLst>
-          </p:cNvPr>
-          <p:cNvSpPr>
-            <a:spLocks noGrp="1"/>
-          </p:cNvSpPr>
-          <p:nvPr>
-            <p:ph type="ftr" sz="quarter" idx="11"/>
-          </p:nvPr>
-        </p:nvSpPr>
-        <p:spPr/>
-        <p:txBody>
-          <a:bodyPr/>
-          <a:lstStyle/>
-          <a:p>
-            <a:r>
-              <a:rPr lang="en-US" noProof="0" dirty="0"/>
-              <a:t>Lukas Gerstlauer, Jakob Kurz  |  AS: PSU  |  T1 / Master ASE  |  26.06.2025</a:t>
-            </a:r>
-          </a:p>
-        </p:txBody>
-      </p:sp>
-      <p:sp>
-        <p:nvSpPr>
-          <p:cNvPr id="3" name="Foliennummernplatzhalter 2">
-            <a:extLst>
-              <a:ext uri="{FF2B5EF4-FFF2-40B4-BE49-F238E27FC236}">
-                <a16:creationId xmlns:a16="http://schemas.microsoft.com/office/drawing/2014/main" id="{17937ABD-4C88-8D88-88A9-4232B7CD4E73}"/>
-              </a:ext>
-            </a:extLst>
-          </p:cNvPr>
-          <p:cNvSpPr>
-            <a:spLocks noGrp="1"/>
-          </p:cNvSpPr>
-          <p:nvPr>
-            <p:ph type="sldNum" sz="quarter" idx="12"/>
-          </p:nvPr>
-        </p:nvSpPr>
-        <p:spPr/>
-        <p:txBody>
-          <a:bodyPr/>
-          <a:lstStyle/>
-          <a:p>
-            <a:r>
-              <a:rPr lang="en-US" noProof="0" dirty="0"/>
-              <a:t>|  </a:t>
-            </a:r>
-            <a:fld id="{E6B5151A-17C4-4431-8407-112C0160A8B6}" type="slidenum">
-              <a:rPr lang="en-US" noProof="0" smtClean="0"/>
-              <a:pPr/>
-              <a:t>9</a:t>
-            </a:fld>
-            <a:endParaRPr lang="en-US" noProof="0" dirty="0"/>
-          </a:p>
-        </p:txBody>
-      </p:sp>
-      <p:sp>
-        <p:nvSpPr>
-          <p:cNvPr id="4" name="Titel 3">
-            <a:extLst>
-              <a:ext uri="{FF2B5EF4-FFF2-40B4-BE49-F238E27FC236}">
-                <a16:creationId xmlns:a16="http://schemas.microsoft.com/office/drawing/2014/main" id="{BDB71D6C-F005-47EF-77BA-8DEF89ACA023}"/>
-              </a:ext>
-            </a:extLst>
-          </p:cNvPr>
-          <p:cNvSpPr>
-            <a:spLocks noGrp="1"/>
-          </p:cNvSpPr>
-          <p:nvPr>
-            <p:ph type="title"/>
-          </p:nvPr>
-        </p:nvSpPr>
-        <p:spPr/>
-        <p:txBody>
-          <a:bodyPr/>
-          <a:lstStyle/>
-          <a:p>
-            <a:r>
-              <a:rPr lang="en-US" noProof="0" dirty="0"/>
-              <a:t>Motion / Transition Model</a:t>
-            </a:r>
-          </a:p>
-        </p:txBody>
-      </p:sp>
-      <mc:AlternateContent xmlns:mc="http://schemas.openxmlformats.org/markup-compatibility/2006" xmlns:a14="http://schemas.microsoft.com/office/drawing/2010/main">
-        <mc:Choice Requires="a14">
-          <p:sp>
-            <p:nvSpPr>
-              <p:cNvPr id="5" name="Inhaltsplatzhalter 4">
-                <a:extLst>
-                  <a:ext uri="{FF2B5EF4-FFF2-40B4-BE49-F238E27FC236}">
-                    <a16:creationId xmlns:a16="http://schemas.microsoft.com/office/drawing/2014/main" id="{D14FE133-3F8F-D0B0-9DBC-5157BE1BFA58}"/>
-                  </a:ext>
-                </a:extLst>
-              </p:cNvPr>
-              <p:cNvSpPr>
-                <a:spLocks noGrp="1"/>
-              </p:cNvSpPr>
-              <p:nvPr>
-                <p:ph idx="13"/>
-              </p:nvPr>
-            </p:nvSpPr>
-            <p:spPr/>
-            <p:txBody>
-              <a:bodyPr/>
-              <a:lstStyle/>
-              <a:p>
-                <a:pPr marL="342900" indent="-342900">
-                  <a:buFont typeface="Arial" panose="020B0604020202020204" pitchFamily="34" charset="0"/>
-                  <a:buChar char="•"/>
-                  <a:tabLst>
-                    <a:tab pos="287338" algn="l"/>
-                  </a:tabLst>
-                </a:pPr>
-                <a:r>
-                  <a:rPr lang="en-US" noProof="0" dirty="0"/>
-                  <a:t>System dynamics function</a:t>
-                </a:r>
-                <a14:m>
-                  <m:oMath xmlns:m="http://schemas.openxmlformats.org/officeDocument/2006/math">
-                    <m:r>
-                      <a:rPr lang="en-US" b="0" i="0" noProof="0" smtClean="0">
-                        <a:latin typeface="Cambria Math" panose="02040503050406030204" pitchFamily="18" charset="0"/>
-                      </a:rPr>
-                      <m:t>: </m:t>
-                    </m:r>
-                    <m:r>
-                      <a:rPr lang="en-US" b="0" i="1" noProof="0" smtClean="0">
-                        <a:latin typeface="Cambria Math" panose="02040503050406030204" pitchFamily="18" charset="0"/>
-                      </a:rPr>
-                      <m:t>𝑓</m:t>
-                    </m:r>
-                    <m:d>
-                      <m:dPr>
-                        <m:ctrlPr>
-                          <a:rPr lang="en-US" b="0" i="1" noProof="0" smtClean="0">
-                            <a:latin typeface="Cambria Math" panose="02040503050406030204" pitchFamily="18" charset="0"/>
-                          </a:rPr>
-                        </m:ctrlPr>
-                      </m:dPr>
-                      <m:e>
-                        <m:r>
-                          <a:rPr lang="en-US" b="0" i="1" noProof="0" smtClean="0">
-                            <a:latin typeface="Cambria Math" panose="02040503050406030204" pitchFamily="18" charset="0"/>
-                          </a:rPr>
-                          <m:t>𝑥</m:t>
-                        </m:r>
-                      </m:e>
-                    </m:d>
-                    <m:r>
-                      <a:rPr lang="en-US" b="0" i="1" noProof="0" smtClean="0">
-                        <a:latin typeface="Cambria Math" panose="02040503050406030204" pitchFamily="18" charset="0"/>
-                      </a:rPr>
-                      <m:t>=</m:t>
-                    </m:r>
-                    <m:d>
-                      <m:dPr>
-                        <m:begChr m:val="["/>
-                        <m:endChr m:val="]"/>
-                        <m:ctrlPr>
-                          <a:rPr lang="en-US" b="0" i="1" noProof="0" smtClean="0">
-                            <a:latin typeface="Cambria Math" panose="02040503050406030204" pitchFamily="18" charset="0"/>
-                          </a:rPr>
-                        </m:ctrlPr>
-                      </m:dPr>
-                      <m:e>
-                        <m:m>
-                          <m:mPr>
-                            <m:mcs>
-                              <m:mc>
-                                <m:mcPr>
-                                  <m:count m:val="1"/>
-                                  <m:mcJc m:val="center"/>
-                                </m:mcPr>
-                              </m:mc>
-                            </m:mcs>
-                            <m:ctrlPr>
-                              <a:rPr lang="en-US" b="0" i="1" noProof="0" smtClean="0">
-                                <a:latin typeface="Cambria Math" panose="02040503050406030204" pitchFamily="18" charset="0"/>
-                              </a:rPr>
-                            </m:ctrlPr>
-                          </m:mPr>
-                          <m:mr>
-                            <m:e>
-                              <m:r>
-                                <a:rPr lang="en-US" b="0" i="1" noProof="0" smtClean="0">
-                                  <a:latin typeface="Cambria Math" panose="02040503050406030204" pitchFamily="18" charset="0"/>
-                                </a:rPr>
-                                <m:t>𝑥</m:t>
-                              </m:r>
-                              <m:r>
-                                <a:rPr lang="en-US" i="1" noProof="0">
-                                  <a:latin typeface="Cambria Math" panose="02040503050406030204" pitchFamily="18" charset="0"/>
-                                </a:rPr>
-                                <m:t>+</m:t>
-                              </m:r>
-                              <m:r>
-                                <a:rPr lang="en-US" b="0" i="1" noProof="0" smtClean="0">
-                                  <a:latin typeface="Cambria Math" panose="02040503050406030204" pitchFamily="18" charset="0"/>
-                                </a:rPr>
-                                <m:t>𝑣</m:t>
-                              </m:r>
-                              <m:r>
-                                <a:rPr lang="en-US" i="1" noProof="0">
-                                  <a:latin typeface="Cambria Math" panose="02040503050406030204" pitchFamily="18" charset="0"/>
-                                </a:rPr>
-                                <m:t>⋅</m:t>
-                              </m:r>
-                              <m:func>
-                                <m:funcPr>
-                                  <m:ctrlPr>
-                                    <a:rPr lang="en-US" i="1" noProof="0">
-                                      <a:latin typeface="Cambria Math" panose="02040503050406030204" pitchFamily="18" charset="0"/>
-                                    </a:rPr>
-                                  </m:ctrlPr>
-                                </m:funcPr>
-                                <m:fName>
-                                  <m:r>
-                                    <m:rPr>
-                                      <m:sty m:val="p"/>
-                                    </m:rPr>
-                                    <a:rPr lang="en-US" noProof="0">
-                                      <a:latin typeface="Cambria Math" panose="02040503050406030204" pitchFamily="18" charset="0"/>
-                                    </a:rPr>
-                                    <m:t>cos</m:t>
-                                  </m:r>
-                                </m:fName>
-                                <m:e>
-                                  <m:d>
-                                    <m:dPr>
-                                      <m:ctrlPr>
-                                        <a:rPr lang="en-US" i="1" noProof="0">
-                                          <a:latin typeface="Cambria Math" panose="02040503050406030204" pitchFamily="18" charset="0"/>
-                                        </a:rPr>
-                                      </m:ctrlPr>
-                                    </m:dPr>
-                                    <m:e>
-                                      <m:sSub>
-                                        <m:sSubPr>
-                                          <m:ctrlPr>
-                                            <a:rPr lang="en-US" i="1" noProof="0">
-                                              <a:latin typeface="Cambria Math" panose="02040503050406030204" pitchFamily="18" charset="0"/>
-                                            </a:rPr>
-                                          </m:ctrlPr>
-                                        </m:sSubPr>
-                                        <m:e>
-                                          <m:r>
-                                            <a:rPr lang="en-US" i="1" noProof="0">
-                                              <a:latin typeface="Cambria Math" panose="02040503050406030204" pitchFamily="18" charset="0"/>
-                                            </a:rPr>
-                                            <m:t>𝜃</m:t>
-                                          </m:r>
-                                        </m:e>
-                                        <m:sub>
-                                          <m:r>
-                                            <a:rPr lang="en-US" i="1" noProof="0">
-                                              <a:latin typeface="Cambria Math" panose="02040503050406030204" pitchFamily="18" charset="0"/>
-                                            </a:rPr>
-                                            <m:t>𝑘</m:t>
-                                          </m:r>
-                                        </m:sub>
-                                      </m:sSub>
-                                    </m:e>
-                                  </m:d>
-                                </m:e>
-                              </m:func>
-                              <m:r>
-                                <a:rPr lang="en-US" i="1" noProof="0">
-                                  <a:latin typeface="Cambria Math" panose="02040503050406030204" pitchFamily="18" charset="0"/>
-                                </a:rPr>
-                                <m:t>⋅</m:t>
-                              </m:r>
-                              <m:r>
-                                <a:rPr lang="en-US" i="1" noProof="0">
-                                  <a:latin typeface="Cambria Math" panose="02040503050406030204" pitchFamily="18" charset="0"/>
-                                </a:rPr>
-                                <m:t>𝑑𝑡</m:t>
-                              </m:r>
-                            </m:e>
-                          </m:mr>
-                          <m:mr>
-                            <m:e>
-                              <m:r>
-                                <a:rPr lang="en-US" b="0" i="1" noProof="0" smtClean="0">
-                                  <a:latin typeface="Cambria Math" panose="02040503050406030204" pitchFamily="18" charset="0"/>
-                                </a:rPr>
-                                <m:t>𝑦</m:t>
-                              </m:r>
-                              <m:r>
-                                <a:rPr lang="en-US" i="1" noProof="0">
-                                  <a:latin typeface="Cambria Math" panose="02040503050406030204" pitchFamily="18" charset="0"/>
-                                </a:rPr>
-                                <m:t>+</m:t>
-                              </m:r>
-                              <m:r>
-                                <a:rPr lang="en-US" b="0" i="1" noProof="0" smtClean="0">
-                                  <a:latin typeface="Cambria Math" panose="02040503050406030204" pitchFamily="18" charset="0"/>
-                                </a:rPr>
-                                <m:t>𝑣</m:t>
-                              </m:r>
-                              <m:r>
-                                <a:rPr lang="en-US" i="1" noProof="0">
-                                  <a:latin typeface="Cambria Math" panose="02040503050406030204" pitchFamily="18" charset="0"/>
-                                </a:rPr>
-                                <m:t>⋅</m:t>
-                              </m:r>
-                              <m:func>
-                                <m:funcPr>
-                                  <m:ctrlPr>
-                                    <a:rPr lang="en-US" i="1" noProof="0">
-                                      <a:latin typeface="Cambria Math" panose="02040503050406030204" pitchFamily="18" charset="0"/>
-                                    </a:rPr>
-                                  </m:ctrlPr>
-                                </m:funcPr>
-                                <m:fName>
-                                  <m:r>
-                                    <a:rPr lang="en-US" i="1" noProof="0">
-                                      <a:latin typeface="Cambria Math" panose="02040503050406030204" pitchFamily="18" charset="0"/>
-                                    </a:rPr>
-                                    <m:t>𝑠𝑖𝑛</m:t>
-                                  </m:r>
-                                </m:fName>
-                                <m:e>
-                                  <m:d>
-                                    <m:dPr>
-                                      <m:ctrlPr>
-                                        <a:rPr lang="en-US" i="1" noProof="0">
-                                          <a:latin typeface="Cambria Math" panose="02040503050406030204" pitchFamily="18" charset="0"/>
-                                        </a:rPr>
-                                      </m:ctrlPr>
-                                    </m:dPr>
-                                    <m:e>
-                                      <m:sSub>
-                                        <m:sSubPr>
-                                          <m:ctrlPr>
-                                            <a:rPr lang="en-US" i="1" noProof="0">
-                                              <a:latin typeface="Cambria Math" panose="02040503050406030204" pitchFamily="18" charset="0"/>
-                                            </a:rPr>
-                                          </m:ctrlPr>
-                                        </m:sSubPr>
-                                        <m:e>
-                                          <m:r>
-                                            <a:rPr lang="en-US" i="1" noProof="0">
-                                              <a:latin typeface="Cambria Math" panose="02040503050406030204" pitchFamily="18" charset="0"/>
-                                            </a:rPr>
-                                            <m:t>𝜃</m:t>
-                                          </m:r>
-                                        </m:e>
-                                        <m:sub>
-                                          <m:r>
-                                            <a:rPr lang="en-US" i="1" noProof="0">
-                                              <a:latin typeface="Cambria Math" panose="02040503050406030204" pitchFamily="18" charset="0"/>
-                                            </a:rPr>
-                                            <m:t>𝑘</m:t>
-                                          </m:r>
-                                        </m:sub>
-                                      </m:sSub>
-                                    </m:e>
-                                  </m:d>
-                                </m:e>
-                              </m:func>
-                              <m:r>
-                                <a:rPr lang="en-US" i="1" noProof="0">
-                                  <a:latin typeface="Cambria Math" panose="02040503050406030204" pitchFamily="18" charset="0"/>
-                                </a:rPr>
-                                <m:t>⋅</m:t>
-                              </m:r>
-                              <m:r>
-                                <a:rPr lang="en-US" i="1" noProof="0">
-                                  <a:latin typeface="Cambria Math" panose="02040503050406030204" pitchFamily="18" charset="0"/>
-                                </a:rPr>
-                                <m:t>𝑑𝑡</m:t>
-                              </m:r>
-                            </m:e>
-                          </m:mr>
-                          <m:mr>
-                            <m:e>
-                              <m:r>
-                                <a:rPr lang="en-US" b="0" i="1" noProof="0" smtClean="0">
-                                  <a:latin typeface="Cambria Math" panose="02040503050406030204" pitchFamily="18" charset="0"/>
-                                </a:rPr>
-                                <m:t>𝜃</m:t>
-                              </m:r>
-                              <m:r>
-                                <a:rPr lang="en-US" i="1" noProof="0">
-                                  <a:latin typeface="Cambria Math" panose="02040503050406030204" pitchFamily="18" charset="0"/>
-                                </a:rPr>
-                                <m:t>+</m:t>
-                              </m:r>
-                              <m:r>
-                                <a:rPr lang="en-US" b="0" i="1" noProof="0" smtClean="0">
-                                  <a:latin typeface="Cambria Math" panose="02040503050406030204" pitchFamily="18" charset="0"/>
-                                </a:rPr>
-                                <m:t>𝜔</m:t>
-                              </m:r>
-                              <m:r>
-                                <a:rPr lang="en-US" i="1" noProof="0">
-                                  <a:latin typeface="Cambria Math" panose="02040503050406030204" pitchFamily="18" charset="0"/>
-                                </a:rPr>
-                                <m:t>⋅</m:t>
-                              </m:r>
-                              <m:r>
-                                <a:rPr lang="en-US" i="1" noProof="0">
-                                  <a:latin typeface="Cambria Math" panose="02040503050406030204" pitchFamily="18" charset="0"/>
-                                </a:rPr>
-                                <m:t>𝑑𝑡</m:t>
-                              </m:r>
-                            </m:e>
-                          </m:mr>
-                          <m:mr>
-                            <m:e>
-                              <m:r>
-                                <a:rPr lang="en-US" b="0" i="1" noProof="0" smtClean="0">
-                                  <a:latin typeface="Cambria Math" panose="02040503050406030204" pitchFamily="18" charset="0"/>
-                                </a:rPr>
-                                <m:t>𝑣</m:t>
-                              </m:r>
-                            </m:e>
-                          </m:mr>
-                          <m:mr>
-                            <m:e>
-                              <m:r>
-                                <a:rPr lang="en-US" b="0" i="1" noProof="0" smtClean="0">
-                                  <a:latin typeface="Cambria Math" panose="02040503050406030204" pitchFamily="18" charset="0"/>
-                                </a:rPr>
-                                <m:t>𝜔</m:t>
-                              </m:r>
-                            </m:e>
-                          </m:mr>
-                        </m:m>
-                      </m:e>
-                    </m:d>
-                  </m:oMath>
-                </a14:m>
-                <a:endParaRPr lang="en-US" b="0" i="1" noProof="0" dirty="0">
-                  <a:latin typeface="Cambria Math" panose="02040503050406030204" pitchFamily="18" charset="0"/>
-                </a:endParaRPr>
-              </a:p>
-            </p:txBody>
-          </p:sp>
-        </mc:Choice>
-        <mc:Fallback xmlns="">
-          <p:sp>
-            <p:nvSpPr>
-              <p:cNvPr id="5" name="Inhaltsplatzhalter 4">
-                <a:extLst>
-                  <a:ext uri="{FF2B5EF4-FFF2-40B4-BE49-F238E27FC236}">
-                    <a16:creationId xmlns:a16="http://schemas.microsoft.com/office/drawing/2014/main" id="{D14FE133-3F8F-D0B0-9DBC-5157BE1BFA58}"/>
-                  </a:ext>
-                </a:extLst>
-              </p:cNvPr>
-              <p:cNvSpPr>
-                <a:spLocks noGrp="1" noRot="1" noChangeAspect="1" noMove="1" noResize="1" noEditPoints="1" noAdjustHandles="1" noChangeArrowheads="1" noChangeShapeType="1" noTextEdit="1"/>
-              </p:cNvSpPr>
-              <p:nvPr>
-                <p:ph idx="13"/>
-              </p:nvPr>
-            </p:nvSpPr>
-            <p:spPr>
-              <a:blipFill>
-                <a:blip r:embed="rId2"/>
-                <a:stretch>
-                  <a:fillRect l="-1447"/>
-                </a:stretch>
-              </a:blipFill>
-            </p:spPr>
-            <p:txBody>
-              <a:bodyPr/>
-              <a:lstStyle/>
-              <a:p>
-                <a:r>
-                  <a:rPr lang="de-DE">
-                    <a:noFill/>
-                  </a:rPr>
-                  <a:t> </a:t>
-                </a:r>
-              </a:p>
-            </p:txBody>
-          </p:sp>
-        </mc:Fallback>
-      </mc:AlternateContent>
-    </p:spTree>
-    <p:extLst>
-      <p:ext uri="{BB962C8B-B14F-4D97-AF65-F5344CB8AC3E}">
-        <p14:creationId xmlns:p14="http://schemas.microsoft.com/office/powerpoint/2010/main" val="3097636369"/>
-      </p:ext>
-    </p:extLst>
-  </p:cSld>
-  <p:clrMapOvr>
-    <a:masterClrMapping/>
-  </p:clrMapOvr>
 </p:sld>
 </file>
 

</xml_diff>